<commit_message>
Added the forwarder code doc.
</commit_message>
<xml_diff>
--- a/doc/designDoc.pptx
+++ b/doc/designDoc.pptx
@@ -262,7 +262,7 @@
           <a:p>
             <a:fld id="{21CF26C0-3F45-4AEC-B024-E55C3E18A278}" type="datetimeFigureOut">
               <a:rPr lang="en-SG" smtClean="0"/>
-              <a:t>3/8/2022</a:t>
+              <a:t>9/8/2022</a:t>
             </a:fld>
             <a:endParaRPr lang="en-SG"/>
           </a:p>
@@ -462,7 +462,7 @@
           <a:p>
             <a:fld id="{21CF26C0-3F45-4AEC-B024-E55C3E18A278}" type="datetimeFigureOut">
               <a:rPr lang="en-SG" smtClean="0"/>
-              <a:t>3/8/2022</a:t>
+              <a:t>9/8/2022</a:t>
             </a:fld>
             <a:endParaRPr lang="en-SG"/>
           </a:p>
@@ -672,7 +672,7 @@
           <a:p>
             <a:fld id="{21CF26C0-3F45-4AEC-B024-E55C3E18A278}" type="datetimeFigureOut">
               <a:rPr lang="en-SG" smtClean="0"/>
-              <a:t>3/8/2022</a:t>
+              <a:t>9/8/2022</a:t>
             </a:fld>
             <a:endParaRPr lang="en-SG"/>
           </a:p>
@@ -872,7 +872,7 @@
           <a:p>
             <a:fld id="{21CF26C0-3F45-4AEC-B024-E55C3E18A278}" type="datetimeFigureOut">
               <a:rPr lang="en-SG" smtClean="0"/>
-              <a:t>3/8/2022</a:t>
+              <a:t>9/8/2022</a:t>
             </a:fld>
             <a:endParaRPr lang="en-SG"/>
           </a:p>
@@ -1148,7 +1148,7 @@
           <a:p>
             <a:fld id="{21CF26C0-3F45-4AEC-B024-E55C3E18A278}" type="datetimeFigureOut">
               <a:rPr lang="en-SG" smtClean="0"/>
-              <a:t>3/8/2022</a:t>
+              <a:t>9/8/2022</a:t>
             </a:fld>
             <a:endParaRPr lang="en-SG"/>
           </a:p>
@@ -1416,7 +1416,7 @@
           <a:p>
             <a:fld id="{21CF26C0-3F45-4AEC-B024-E55C3E18A278}" type="datetimeFigureOut">
               <a:rPr lang="en-SG" smtClean="0"/>
-              <a:t>3/8/2022</a:t>
+              <a:t>9/8/2022</a:t>
             </a:fld>
             <a:endParaRPr lang="en-SG"/>
           </a:p>
@@ -1831,7 +1831,7 @@
           <a:p>
             <a:fld id="{21CF26C0-3F45-4AEC-B024-E55C3E18A278}" type="datetimeFigureOut">
               <a:rPr lang="en-SG" smtClean="0"/>
-              <a:t>3/8/2022</a:t>
+              <a:t>9/8/2022</a:t>
             </a:fld>
             <a:endParaRPr lang="en-SG"/>
           </a:p>
@@ -1973,7 +1973,7 @@
           <a:p>
             <a:fld id="{21CF26C0-3F45-4AEC-B024-E55C3E18A278}" type="datetimeFigureOut">
               <a:rPr lang="en-SG" smtClean="0"/>
-              <a:t>3/8/2022</a:t>
+              <a:t>9/8/2022</a:t>
             </a:fld>
             <a:endParaRPr lang="en-SG"/>
           </a:p>
@@ -2086,7 +2086,7 @@
           <a:p>
             <a:fld id="{21CF26C0-3F45-4AEC-B024-E55C3E18A278}" type="datetimeFigureOut">
               <a:rPr lang="en-SG" smtClean="0"/>
-              <a:t>3/8/2022</a:t>
+              <a:t>9/8/2022</a:t>
             </a:fld>
             <a:endParaRPr lang="en-SG"/>
           </a:p>
@@ -2399,7 +2399,7 @@
           <a:p>
             <a:fld id="{21CF26C0-3F45-4AEC-B024-E55C3E18A278}" type="datetimeFigureOut">
               <a:rPr lang="en-SG" smtClean="0"/>
-              <a:t>3/8/2022</a:t>
+              <a:t>9/8/2022</a:t>
             </a:fld>
             <a:endParaRPr lang="en-SG"/>
           </a:p>
@@ -2688,7 +2688,7 @@
           <a:p>
             <a:fld id="{21CF26C0-3F45-4AEC-B024-E55C3E18A278}" type="datetimeFigureOut">
               <a:rPr lang="en-SG" smtClean="0"/>
-              <a:t>3/8/2022</a:t>
+              <a:t>9/8/2022</a:t>
             </a:fld>
             <a:endParaRPr lang="en-SG"/>
           </a:p>
@@ -2931,7 +2931,7 @@
           <a:p>
             <a:fld id="{21CF26C0-3F45-4AEC-B024-E55C3E18A278}" type="datetimeFigureOut">
               <a:rPr lang="en-SG" smtClean="0"/>
-              <a:t>3/8/2022</a:t>
+              <a:t>9/8/2022</a:t>
             </a:fld>
             <a:endParaRPr lang="en-SG"/>
           </a:p>
@@ -4713,13 +4713,14 @@
         </p:nvCxnSpPr>
         <p:spPr>
           <a:xfrm>
-            <a:off x="1090532" y="2982225"/>
-            <a:ext cx="445658" cy="0"/>
+            <a:off x="1103340" y="5525491"/>
+            <a:ext cx="812096" cy="0"/>
           </a:xfrm>
           <a:prstGeom prst="straightConnector1">
             <a:avLst/>
           </a:prstGeom>
           <a:ln>
+            <a:prstDash val="dash"/>
             <a:tailEnd type="triangle"/>
           </a:ln>
         </p:spPr>
@@ -7028,6 +7029,1159 @@
             <a:r>
               <a:rPr lang="en-SG" sz="900" b="1" dirty="0"/>
               <a:t>Use case: simulate stress test for the CTFD cluster.   </a:t>
+            </a:r>
+          </a:p>
+        </p:txBody>
+      </p:sp>
+      <p:pic>
+        <p:nvPicPr>
+          <p:cNvPr id="2" name="Picture 4">
+            <a:extLst>
+              <a:ext uri="{FF2B5EF4-FFF2-40B4-BE49-F238E27FC236}">
+                <a16:creationId xmlns:a16="http://schemas.microsoft.com/office/drawing/2014/main" id="{77384891-A4D2-1312-4F32-CBBC4125607F}"/>
+              </a:ext>
+            </a:extLst>
+          </p:cNvPr>
+          <p:cNvPicPr>
+            <a:picLocks noChangeAspect="1" noChangeArrowheads="1"/>
+          </p:cNvPicPr>
+          <p:nvPr/>
+        </p:nvPicPr>
+        <p:blipFill>
+          <a:blip r:embed="rId2">
+            <a:extLst>
+              <a:ext uri="{28A0092B-C50C-407E-A947-70E740481C1C}">
+                <a14:useLocalDpi xmlns:a14="http://schemas.microsoft.com/office/drawing/2010/main" val="0"/>
+              </a:ext>
+            </a:extLst>
+          </a:blip>
+          <a:srcRect/>
+          <a:stretch>
+            <a:fillRect/>
+          </a:stretch>
+        </p:blipFill>
+        <p:spPr bwMode="auto">
+          <a:xfrm>
+            <a:off x="642130" y="5310584"/>
+            <a:ext cx="429814" cy="429814"/>
+          </a:xfrm>
+          <a:prstGeom prst="rect">
+            <a:avLst/>
+          </a:prstGeom>
+          <a:noFill/>
+          <a:extLst>
+            <a:ext uri="{909E8E84-426E-40DD-AFC4-6F175D3DCCD1}">
+              <a14:hiddenFill xmlns:a14="http://schemas.microsoft.com/office/drawing/2010/main">
+                <a:solidFill>
+                  <a:srgbClr val="FFFFFF"/>
+                </a:solidFill>
+              </a14:hiddenFill>
+            </a:ext>
+          </a:extLst>
+        </p:spPr>
+      </p:pic>
+      <p:pic>
+        <p:nvPicPr>
+          <p:cNvPr id="7" name="Picture 6">
+            <a:extLst>
+              <a:ext uri="{FF2B5EF4-FFF2-40B4-BE49-F238E27FC236}">
+                <a16:creationId xmlns:a16="http://schemas.microsoft.com/office/drawing/2014/main" id="{E58CE004-2FCC-1AD5-8A27-A3CC84BAD000}"/>
+              </a:ext>
+            </a:extLst>
+          </p:cNvPr>
+          <p:cNvPicPr>
+            <a:picLocks noChangeAspect="1"/>
+          </p:cNvPicPr>
+          <p:nvPr/>
+        </p:nvPicPr>
+        <p:blipFill>
+          <a:blip r:embed="rId3"/>
+          <a:stretch>
+            <a:fillRect/>
+          </a:stretch>
+        </p:blipFill>
+        <p:spPr>
+          <a:xfrm>
+            <a:off x="1949862" y="5394686"/>
+            <a:ext cx="357596" cy="261610"/>
+          </a:xfrm>
+          <a:prstGeom prst="rect">
+            <a:avLst/>
+          </a:prstGeom>
+          <a:ln w="3175">
+            <a:solidFill>
+              <a:schemeClr val="tx1"/>
+            </a:solidFill>
+          </a:ln>
+        </p:spPr>
+      </p:pic>
+      <p:cxnSp>
+        <p:nvCxnSpPr>
+          <p:cNvPr id="8" name="Straight Arrow Connector 7">
+            <a:extLst>
+              <a:ext uri="{FF2B5EF4-FFF2-40B4-BE49-F238E27FC236}">
+                <a16:creationId xmlns:a16="http://schemas.microsoft.com/office/drawing/2014/main" id="{2110BF41-049C-FCCF-A6AE-A7495012AFA4}"/>
+              </a:ext>
+            </a:extLst>
+          </p:cNvPr>
+          <p:cNvCxnSpPr>
+            <a:cxnSpLocks/>
+          </p:cNvCxnSpPr>
+          <p:nvPr/>
+        </p:nvCxnSpPr>
+        <p:spPr>
+          <a:xfrm flipV="1">
+            <a:off x="2385375" y="5530758"/>
+            <a:ext cx="390171" cy="1893"/>
+          </a:xfrm>
+          <a:prstGeom prst="straightConnector1">
+            <a:avLst/>
+          </a:prstGeom>
+          <a:ln>
+            <a:tailEnd type="triangle"/>
+          </a:ln>
+        </p:spPr>
+        <p:style>
+          <a:lnRef idx="1">
+            <a:schemeClr val="accent1"/>
+          </a:lnRef>
+          <a:fillRef idx="0">
+            <a:schemeClr val="accent1"/>
+          </a:fillRef>
+          <a:effectRef idx="0">
+            <a:schemeClr val="accent1"/>
+          </a:effectRef>
+          <a:fontRef idx="minor">
+            <a:schemeClr val="tx1"/>
+          </a:fontRef>
+        </p:style>
+      </p:cxnSp>
+      <p:pic>
+        <p:nvPicPr>
+          <p:cNvPr id="10" name="Picture 9">
+            <a:extLst>
+              <a:ext uri="{FF2B5EF4-FFF2-40B4-BE49-F238E27FC236}">
+                <a16:creationId xmlns:a16="http://schemas.microsoft.com/office/drawing/2014/main" id="{B8E56B20-B3CD-D09D-FE57-05BE09774D07}"/>
+              </a:ext>
+            </a:extLst>
+          </p:cNvPr>
+          <p:cNvPicPr>
+            <a:picLocks noChangeAspect="1"/>
+          </p:cNvPicPr>
+          <p:nvPr/>
+        </p:nvPicPr>
+        <p:blipFill>
+          <a:blip r:embed="rId3"/>
+          <a:stretch>
+            <a:fillRect/>
+          </a:stretch>
+        </p:blipFill>
+        <p:spPr>
+          <a:xfrm>
+            <a:off x="2829354" y="5401846"/>
+            <a:ext cx="357596" cy="261610"/>
+          </a:xfrm>
+          <a:prstGeom prst="rect">
+            <a:avLst/>
+          </a:prstGeom>
+          <a:ln w="3175">
+            <a:solidFill>
+              <a:schemeClr val="tx1"/>
+            </a:solidFill>
+          </a:ln>
+        </p:spPr>
+      </p:pic>
+      <p:sp>
+        <p:nvSpPr>
+          <p:cNvPr id="12" name="TextBox 11">
+            <a:extLst>
+              <a:ext uri="{FF2B5EF4-FFF2-40B4-BE49-F238E27FC236}">
+                <a16:creationId xmlns:a16="http://schemas.microsoft.com/office/drawing/2014/main" id="{6947F463-40A2-AC36-38E9-75E747C562D7}"/>
+              </a:ext>
+            </a:extLst>
+          </p:cNvPr>
+          <p:cNvSpPr txBox="1"/>
+          <p:nvPr/>
+        </p:nvSpPr>
+        <p:spPr>
+          <a:xfrm>
+            <a:off x="3203238" y="5309080"/>
+            <a:ext cx="362198" cy="369332"/>
+          </a:xfrm>
+          <a:prstGeom prst="rect">
+            <a:avLst/>
+          </a:prstGeom>
+          <a:noFill/>
+        </p:spPr>
+        <p:txBody>
+          <a:bodyPr wrap="square" rtlCol="0">
+            <a:spAutoFit/>
+          </a:bodyPr>
+          <a:lstStyle/>
+          <a:p>
+            <a:r>
+              <a:rPr lang="en-US" dirty="0"/>
+              <a:t>…</a:t>
+            </a:r>
+            <a:endParaRPr lang="en-SG" dirty="0"/>
+          </a:p>
+        </p:txBody>
+      </p:sp>
+      <p:pic>
+        <p:nvPicPr>
+          <p:cNvPr id="13" name="Picture 12">
+            <a:extLst>
+              <a:ext uri="{FF2B5EF4-FFF2-40B4-BE49-F238E27FC236}">
+                <a16:creationId xmlns:a16="http://schemas.microsoft.com/office/drawing/2014/main" id="{7F7A3C49-025E-1A49-A298-3A7DA7124EA6}"/>
+              </a:ext>
+            </a:extLst>
+          </p:cNvPr>
+          <p:cNvPicPr>
+            <a:picLocks noChangeAspect="1"/>
+          </p:cNvPicPr>
+          <p:nvPr/>
+        </p:nvPicPr>
+        <p:blipFill>
+          <a:blip r:embed="rId3"/>
+          <a:stretch>
+            <a:fillRect/>
+          </a:stretch>
+        </p:blipFill>
+        <p:spPr>
+          <a:xfrm>
+            <a:off x="3530048" y="5394686"/>
+            <a:ext cx="357596" cy="261610"/>
+          </a:xfrm>
+          <a:prstGeom prst="rect">
+            <a:avLst/>
+          </a:prstGeom>
+          <a:ln w="3175">
+            <a:solidFill>
+              <a:schemeClr val="tx1"/>
+            </a:solidFill>
+          </a:ln>
+        </p:spPr>
+      </p:pic>
+      <p:pic>
+        <p:nvPicPr>
+          <p:cNvPr id="15" name="Picture 14">
+            <a:extLst>
+              <a:ext uri="{FF2B5EF4-FFF2-40B4-BE49-F238E27FC236}">
+                <a16:creationId xmlns:a16="http://schemas.microsoft.com/office/drawing/2014/main" id="{8F1443B9-8090-F780-5BDE-D888F3A79E17}"/>
+              </a:ext>
+            </a:extLst>
+          </p:cNvPr>
+          <p:cNvPicPr>
+            <a:picLocks noChangeAspect="1"/>
+          </p:cNvPicPr>
+          <p:nvPr/>
+        </p:nvPicPr>
+        <p:blipFill>
+          <a:blip r:embed="rId5"/>
+          <a:stretch>
+            <a:fillRect/>
+          </a:stretch>
+        </p:blipFill>
+        <p:spPr>
+          <a:xfrm>
+            <a:off x="2326086" y="5928138"/>
+            <a:ext cx="338693" cy="346110"/>
+          </a:xfrm>
+          <a:prstGeom prst="rect">
+            <a:avLst/>
+          </a:prstGeom>
+        </p:spPr>
+      </p:pic>
+      <p:cxnSp>
+        <p:nvCxnSpPr>
+          <p:cNvPr id="17" name="Straight Arrow Connector 16">
+            <a:extLst>
+              <a:ext uri="{FF2B5EF4-FFF2-40B4-BE49-F238E27FC236}">
+                <a16:creationId xmlns:a16="http://schemas.microsoft.com/office/drawing/2014/main" id="{03EE8A19-2173-5B53-491F-0E6F474D0B89}"/>
+              </a:ext>
+            </a:extLst>
+          </p:cNvPr>
+          <p:cNvCxnSpPr>
+            <a:cxnSpLocks/>
+            <a:stCxn id="7" idx="2"/>
+            <a:endCxn id="15" idx="0"/>
+          </p:cNvCxnSpPr>
+          <p:nvPr/>
+        </p:nvCxnSpPr>
+        <p:spPr>
+          <a:xfrm>
+            <a:off x="2128660" y="5656296"/>
+            <a:ext cx="366773" cy="271842"/>
+          </a:xfrm>
+          <a:prstGeom prst="straightConnector1">
+            <a:avLst/>
+          </a:prstGeom>
+          <a:ln>
+            <a:tailEnd type="triangle"/>
+          </a:ln>
+        </p:spPr>
+        <p:style>
+          <a:lnRef idx="1">
+            <a:schemeClr val="accent1"/>
+          </a:lnRef>
+          <a:fillRef idx="0">
+            <a:schemeClr val="accent1"/>
+          </a:fillRef>
+          <a:effectRef idx="0">
+            <a:schemeClr val="accent1"/>
+          </a:effectRef>
+          <a:fontRef idx="minor">
+            <a:schemeClr val="tx1"/>
+          </a:fontRef>
+        </p:style>
+      </p:cxnSp>
+      <p:pic>
+        <p:nvPicPr>
+          <p:cNvPr id="19" name="Picture 18">
+            <a:extLst>
+              <a:ext uri="{FF2B5EF4-FFF2-40B4-BE49-F238E27FC236}">
+                <a16:creationId xmlns:a16="http://schemas.microsoft.com/office/drawing/2014/main" id="{CCC44A42-7E25-9A2C-00A1-7054C980EB77}"/>
+              </a:ext>
+            </a:extLst>
+          </p:cNvPr>
+          <p:cNvPicPr>
+            <a:picLocks noChangeAspect="1"/>
+          </p:cNvPicPr>
+          <p:nvPr/>
+        </p:nvPicPr>
+        <p:blipFill>
+          <a:blip r:embed="rId3"/>
+          <a:stretch>
+            <a:fillRect/>
+          </a:stretch>
+        </p:blipFill>
+        <p:spPr>
+          <a:xfrm>
+            <a:off x="3104791" y="5941266"/>
+            <a:ext cx="334496" cy="244711"/>
+          </a:xfrm>
+          <a:prstGeom prst="rect">
+            <a:avLst/>
+          </a:prstGeom>
+          <a:ln w="3175">
+            <a:solidFill>
+              <a:schemeClr val="tx1"/>
+            </a:solidFill>
+          </a:ln>
+        </p:spPr>
+      </p:pic>
+      <p:cxnSp>
+        <p:nvCxnSpPr>
+          <p:cNvPr id="20" name="Straight Arrow Connector 19">
+            <a:extLst>
+              <a:ext uri="{FF2B5EF4-FFF2-40B4-BE49-F238E27FC236}">
+                <a16:creationId xmlns:a16="http://schemas.microsoft.com/office/drawing/2014/main" id="{9CE24489-0446-3CFC-0DF1-8FF0B2416221}"/>
+              </a:ext>
+            </a:extLst>
+          </p:cNvPr>
+          <p:cNvCxnSpPr>
+            <a:cxnSpLocks/>
+            <a:endCxn id="19" idx="0"/>
+          </p:cNvCxnSpPr>
+          <p:nvPr/>
+        </p:nvCxnSpPr>
+        <p:spPr>
+          <a:xfrm>
+            <a:off x="2974003" y="5638641"/>
+            <a:ext cx="298036" cy="302625"/>
+          </a:xfrm>
+          <a:prstGeom prst="straightConnector1">
+            <a:avLst/>
+          </a:prstGeom>
+          <a:ln>
+            <a:tailEnd type="triangle"/>
+          </a:ln>
+        </p:spPr>
+        <p:style>
+          <a:lnRef idx="1">
+            <a:schemeClr val="accent1"/>
+          </a:lnRef>
+          <a:fillRef idx="0">
+            <a:schemeClr val="accent1"/>
+          </a:fillRef>
+          <a:effectRef idx="0">
+            <a:schemeClr val="accent1"/>
+          </a:effectRef>
+          <a:fontRef idx="minor">
+            <a:schemeClr val="tx1"/>
+          </a:fontRef>
+        </p:style>
+      </p:cxnSp>
+      <p:pic>
+        <p:nvPicPr>
+          <p:cNvPr id="22" name="Picture 21">
+            <a:extLst>
+              <a:ext uri="{FF2B5EF4-FFF2-40B4-BE49-F238E27FC236}">
+                <a16:creationId xmlns:a16="http://schemas.microsoft.com/office/drawing/2014/main" id="{D6A823D9-3258-478B-3E71-683AEBC7CDF6}"/>
+              </a:ext>
+            </a:extLst>
+          </p:cNvPr>
+          <p:cNvPicPr>
+            <a:picLocks noChangeAspect="1"/>
+          </p:cNvPicPr>
+          <p:nvPr/>
+        </p:nvPicPr>
+        <p:blipFill>
+          <a:blip r:embed="rId5"/>
+          <a:stretch>
+            <a:fillRect/>
+          </a:stretch>
+        </p:blipFill>
+        <p:spPr>
+          <a:xfrm>
+            <a:off x="3388115" y="6426144"/>
+            <a:ext cx="338693" cy="346110"/>
+          </a:xfrm>
+          <a:prstGeom prst="rect">
+            <a:avLst/>
+          </a:prstGeom>
+        </p:spPr>
+      </p:pic>
+      <p:cxnSp>
+        <p:nvCxnSpPr>
+          <p:cNvPr id="23" name="Straight Arrow Connector 22">
+            <a:extLst>
+              <a:ext uri="{FF2B5EF4-FFF2-40B4-BE49-F238E27FC236}">
+                <a16:creationId xmlns:a16="http://schemas.microsoft.com/office/drawing/2014/main" id="{BD9F6756-64F9-4DC3-77B0-9363B08B28DB}"/>
+              </a:ext>
+            </a:extLst>
+          </p:cNvPr>
+          <p:cNvCxnSpPr>
+            <a:cxnSpLocks/>
+            <a:stCxn id="19" idx="2"/>
+            <a:endCxn id="22" idx="0"/>
+          </p:cNvCxnSpPr>
+          <p:nvPr/>
+        </p:nvCxnSpPr>
+        <p:spPr>
+          <a:xfrm>
+            <a:off x="3272039" y="6185977"/>
+            <a:ext cx="285423" cy="240167"/>
+          </a:xfrm>
+          <a:prstGeom prst="straightConnector1">
+            <a:avLst/>
+          </a:prstGeom>
+          <a:ln>
+            <a:tailEnd type="triangle"/>
+          </a:ln>
+        </p:spPr>
+        <p:style>
+          <a:lnRef idx="1">
+            <a:schemeClr val="accent1"/>
+          </a:lnRef>
+          <a:fillRef idx="0">
+            <a:schemeClr val="accent1"/>
+          </a:fillRef>
+          <a:effectRef idx="0">
+            <a:schemeClr val="accent1"/>
+          </a:effectRef>
+          <a:fontRef idx="minor">
+            <a:schemeClr val="tx1"/>
+          </a:fontRef>
+        </p:style>
+      </p:cxnSp>
+      <p:cxnSp>
+        <p:nvCxnSpPr>
+          <p:cNvPr id="30" name="Straight Arrow Connector 29">
+            <a:extLst>
+              <a:ext uri="{FF2B5EF4-FFF2-40B4-BE49-F238E27FC236}">
+                <a16:creationId xmlns:a16="http://schemas.microsoft.com/office/drawing/2014/main" id="{6C6F5C89-5E83-15EF-4C28-6F827C609338}"/>
+              </a:ext>
+            </a:extLst>
+          </p:cNvPr>
+          <p:cNvCxnSpPr>
+            <a:cxnSpLocks/>
+            <a:endCxn id="35" idx="1"/>
+          </p:cNvCxnSpPr>
+          <p:nvPr/>
+        </p:nvCxnSpPr>
+        <p:spPr>
+          <a:xfrm>
+            <a:off x="3880733" y="5569194"/>
+            <a:ext cx="345269" cy="358944"/>
+          </a:xfrm>
+          <a:prstGeom prst="straightConnector1">
+            <a:avLst/>
+          </a:prstGeom>
+          <a:ln>
+            <a:tailEnd type="triangle"/>
+          </a:ln>
+        </p:spPr>
+        <p:style>
+          <a:lnRef idx="1">
+            <a:schemeClr val="accent1"/>
+          </a:lnRef>
+          <a:fillRef idx="0">
+            <a:schemeClr val="accent1"/>
+          </a:fillRef>
+          <a:effectRef idx="0">
+            <a:schemeClr val="accent1"/>
+          </a:effectRef>
+          <a:fontRef idx="minor">
+            <a:schemeClr val="tx1"/>
+          </a:fontRef>
+        </p:style>
+      </p:cxnSp>
+      <p:cxnSp>
+        <p:nvCxnSpPr>
+          <p:cNvPr id="32" name="Straight Arrow Connector 31">
+            <a:extLst>
+              <a:ext uri="{FF2B5EF4-FFF2-40B4-BE49-F238E27FC236}">
+                <a16:creationId xmlns:a16="http://schemas.microsoft.com/office/drawing/2014/main" id="{0C05B9AA-6032-E278-8BB4-93CA25C9E832}"/>
+              </a:ext>
+            </a:extLst>
+          </p:cNvPr>
+          <p:cNvCxnSpPr>
+            <a:cxnSpLocks/>
+          </p:cNvCxnSpPr>
+          <p:nvPr/>
+        </p:nvCxnSpPr>
+        <p:spPr>
+          <a:xfrm>
+            <a:off x="3880733" y="5524470"/>
+            <a:ext cx="333721" cy="0"/>
+          </a:xfrm>
+          <a:prstGeom prst="straightConnector1">
+            <a:avLst/>
+          </a:prstGeom>
+          <a:ln>
+            <a:tailEnd type="triangle"/>
+          </a:ln>
+        </p:spPr>
+        <p:style>
+          <a:lnRef idx="1">
+            <a:schemeClr val="accent1"/>
+          </a:lnRef>
+          <a:fillRef idx="0">
+            <a:schemeClr val="accent1"/>
+          </a:fillRef>
+          <a:effectRef idx="0">
+            <a:schemeClr val="accent1"/>
+          </a:effectRef>
+          <a:fontRef idx="minor">
+            <a:schemeClr val="tx1"/>
+          </a:fontRef>
+        </p:style>
+      </p:cxnSp>
+      <p:pic>
+        <p:nvPicPr>
+          <p:cNvPr id="34" name="Picture 33">
+            <a:extLst>
+              <a:ext uri="{FF2B5EF4-FFF2-40B4-BE49-F238E27FC236}">
+                <a16:creationId xmlns:a16="http://schemas.microsoft.com/office/drawing/2014/main" id="{F6D048AB-2B23-F530-1710-9589C0E2B42C}"/>
+              </a:ext>
+            </a:extLst>
+          </p:cNvPr>
+          <p:cNvPicPr>
+            <a:picLocks noChangeAspect="1"/>
+          </p:cNvPicPr>
+          <p:nvPr/>
+        </p:nvPicPr>
+        <p:blipFill>
+          <a:blip r:embed="rId5"/>
+          <a:stretch>
+            <a:fillRect/>
+          </a:stretch>
+        </p:blipFill>
+        <p:spPr>
+          <a:xfrm>
+            <a:off x="4226002" y="5320691"/>
+            <a:ext cx="338693" cy="346110"/>
+          </a:xfrm>
+          <a:prstGeom prst="rect">
+            <a:avLst/>
+          </a:prstGeom>
+        </p:spPr>
+      </p:pic>
+      <p:pic>
+        <p:nvPicPr>
+          <p:cNvPr id="35" name="Picture 34">
+            <a:extLst>
+              <a:ext uri="{FF2B5EF4-FFF2-40B4-BE49-F238E27FC236}">
+                <a16:creationId xmlns:a16="http://schemas.microsoft.com/office/drawing/2014/main" id="{C6AFCD8E-6A78-2A56-113C-1E5B0057F111}"/>
+              </a:ext>
+            </a:extLst>
+          </p:cNvPr>
+          <p:cNvPicPr>
+            <a:picLocks noChangeAspect="1"/>
+          </p:cNvPicPr>
+          <p:nvPr/>
+        </p:nvPicPr>
+        <p:blipFill>
+          <a:blip r:embed="rId5"/>
+          <a:stretch>
+            <a:fillRect/>
+          </a:stretch>
+        </p:blipFill>
+        <p:spPr>
+          <a:xfrm>
+            <a:off x="4226002" y="5755083"/>
+            <a:ext cx="347129" cy="346110"/>
+          </a:xfrm>
+          <a:prstGeom prst="rect">
+            <a:avLst/>
+          </a:prstGeom>
+        </p:spPr>
+      </p:pic>
+      <p:sp>
+        <p:nvSpPr>
+          <p:cNvPr id="37" name="TextBox 36">
+            <a:extLst>
+              <a:ext uri="{FF2B5EF4-FFF2-40B4-BE49-F238E27FC236}">
+                <a16:creationId xmlns:a16="http://schemas.microsoft.com/office/drawing/2014/main" id="{A7755252-F5A5-A7D8-B2EE-AC1E1D1AD47C}"/>
+              </a:ext>
+            </a:extLst>
+          </p:cNvPr>
+          <p:cNvSpPr txBox="1"/>
+          <p:nvPr/>
+        </p:nvSpPr>
+        <p:spPr>
+          <a:xfrm>
+            <a:off x="1693183" y="5130004"/>
+            <a:ext cx="802249" cy="230832"/>
+          </a:xfrm>
+          <a:prstGeom prst="rect">
+            <a:avLst/>
+          </a:prstGeom>
+          <a:noFill/>
+        </p:spPr>
+        <p:txBody>
+          <a:bodyPr wrap="square" rtlCol="0">
+            <a:spAutoFit/>
+          </a:bodyPr>
+          <a:lstStyle/>
+          <a:p>
+            <a:r>
+              <a:rPr lang="en-SG" sz="900" dirty="0">
+                <a:solidFill>
+                  <a:srgbClr val="002060"/>
+                </a:solidFill>
+              </a:rPr>
+              <a:t>jumphost1</a:t>
+            </a:r>
+          </a:p>
+        </p:txBody>
+      </p:sp>
+      <p:sp>
+        <p:nvSpPr>
+          <p:cNvPr id="38" name="TextBox 37">
+            <a:extLst>
+              <a:ext uri="{FF2B5EF4-FFF2-40B4-BE49-F238E27FC236}">
+                <a16:creationId xmlns:a16="http://schemas.microsoft.com/office/drawing/2014/main" id="{C1C95A8C-1A3E-AD03-89BF-28F66D6A654F}"/>
+              </a:ext>
+            </a:extLst>
+          </p:cNvPr>
+          <p:cNvSpPr txBox="1"/>
+          <p:nvPr/>
+        </p:nvSpPr>
+        <p:spPr>
+          <a:xfrm>
+            <a:off x="2606308" y="5135654"/>
+            <a:ext cx="802249" cy="230832"/>
+          </a:xfrm>
+          <a:prstGeom prst="rect">
+            <a:avLst/>
+          </a:prstGeom>
+          <a:noFill/>
+        </p:spPr>
+        <p:txBody>
+          <a:bodyPr wrap="square" rtlCol="0">
+            <a:spAutoFit/>
+          </a:bodyPr>
+          <a:lstStyle/>
+          <a:p>
+            <a:r>
+              <a:rPr lang="en-SG" sz="900" dirty="0">
+                <a:solidFill>
+                  <a:srgbClr val="002060"/>
+                </a:solidFill>
+              </a:rPr>
+              <a:t>jumphost2</a:t>
+            </a:r>
+          </a:p>
+        </p:txBody>
+      </p:sp>
+      <p:sp>
+        <p:nvSpPr>
+          <p:cNvPr id="39" name="TextBox 38">
+            <a:extLst>
+              <a:ext uri="{FF2B5EF4-FFF2-40B4-BE49-F238E27FC236}">
+                <a16:creationId xmlns:a16="http://schemas.microsoft.com/office/drawing/2014/main" id="{55BC5E86-E304-EFAE-AFB4-9B50FF695BBE}"/>
+              </a:ext>
+            </a:extLst>
+          </p:cNvPr>
+          <p:cNvSpPr txBox="1"/>
+          <p:nvPr/>
+        </p:nvSpPr>
+        <p:spPr>
+          <a:xfrm>
+            <a:off x="3382589" y="5121765"/>
+            <a:ext cx="802249" cy="230832"/>
+          </a:xfrm>
+          <a:prstGeom prst="rect">
+            <a:avLst/>
+          </a:prstGeom>
+          <a:noFill/>
+        </p:spPr>
+        <p:txBody>
+          <a:bodyPr wrap="square" rtlCol="0">
+            <a:spAutoFit/>
+          </a:bodyPr>
+          <a:lstStyle/>
+          <a:p>
+            <a:r>
+              <a:rPr lang="en-SG" sz="900" dirty="0" err="1">
+                <a:solidFill>
+                  <a:srgbClr val="002060"/>
+                </a:solidFill>
+              </a:rPr>
+              <a:t>Jumphost</a:t>
+            </a:r>
+            <a:r>
+              <a:rPr lang="en-SG" sz="900" dirty="0">
+                <a:solidFill>
+                  <a:srgbClr val="002060"/>
+                </a:solidFill>
+              </a:rPr>
+              <a:t> N</a:t>
+            </a:r>
+          </a:p>
+        </p:txBody>
+      </p:sp>
+      <p:sp>
+        <p:nvSpPr>
+          <p:cNvPr id="40" name="TextBox 39">
+            <a:extLst>
+              <a:ext uri="{FF2B5EF4-FFF2-40B4-BE49-F238E27FC236}">
+                <a16:creationId xmlns:a16="http://schemas.microsoft.com/office/drawing/2014/main" id="{3852DA1E-55C1-1C6F-2EE8-D902F312D28E}"/>
+              </a:ext>
+            </a:extLst>
+          </p:cNvPr>
+          <p:cNvSpPr txBox="1"/>
+          <p:nvPr/>
+        </p:nvSpPr>
+        <p:spPr>
+          <a:xfrm>
+            <a:off x="4605859" y="5282236"/>
+            <a:ext cx="1890206" cy="230832"/>
+          </a:xfrm>
+          <a:prstGeom prst="rect">
+            <a:avLst/>
+          </a:prstGeom>
+          <a:noFill/>
+        </p:spPr>
+        <p:txBody>
+          <a:bodyPr wrap="square" rtlCol="0">
+            <a:spAutoFit/>
+          </a:bodyPr>
+          <a:lstStyle/>
+          <a:p>
+            <a:r>
+              <a:rPr lang="en-US" sz="900" dirty="0">
+                <a:solidFill>
+                  <a:srgbClr val="002060"/>
+                </a:solidFill>
+              </a:rPr>
+              <a:t>RemoteWebHost-3: 80</a:t>
+            </a:r>
+            <a:endParaRPr lang="en-SG" sz="900" dirty="0">
+              <a:solidFill>
+                <a:srgbClr val="002060"/>
+              </a:solidFill>
+            </a:endParaRPr>
+          </a:p>
+        </p:txBody>
+      </p:sp>
+      <p:sp>
+        <p:nvSpPr>
+          <p:cNvPr id="41" name="TextBox 40">
+            <a:extLst>
+              <a:ext uri="{FF2B5EF4-FFF2-40B4-BE49-F238E27FC236}">
+                <a16:creationId xmlns:a16="http://schemas.microsoft.com/office/drawing/2014/main" id="{30CAC46D-2EA5-650B-D679-EFB4A3234D48}"/>
+              </a:ext>
+            </a:extLst>
+          </p:cNvPr>
+          <p:cNvSpPr txBox="1"/>
+          <p:nvPr/>
+        </p:nvSpPr>
+        <p:spPr>
+          <a:xfrm>
+            <a:off x="4624978" y="5755083"/>
+            <a:ext cx="1890206" cy="230832"/>
+          </a:xfrm>
+          <a:prstGeom prst="rect">
+            <a:avLst/>
+          </a:prstGeom>
+          <a:noFill/>
+        </p:spPr>
+        <p:txBody>
+          <a:bodyPr wrap="square" rtlCol="0">
+            <a:spAutoFit/>
+          </a:bodyPr>
+          <a:lstStyle/>
+          <a:p>
+            <a:r>
+              <a:rPr lang="en-US" sz="900" dirty="0" err="1">
+                <a:solidFill>
+                  <a:srgbClr val="002060"/>
+                </a:solidFill>
+              </a:rPr>
+              <a:t>ServerIPMIweb</a:t>
+            </a:r>
+            <a:r>
+              <a:rPr lang="en-US" sz="900" dirty="0">
+                <a:solidFill>
+                  <a:srgbClr val="002060"/>
+                </a:solidFill>
+              </a:rPr>
+              <a:t>: 623</a:t>
+            </a:r>
+            <a:endParaRPr lang="en-SG" sz="900" dirty="0">
+              <a:solidFill>
+                <a:srgbClr val="002060"/>
+              </a:solidFill>
+            </a:endParaRPr>
+          </a:p>
+        </p:txBody>
+      </p:sp>
+      <p:sp>
+        <p:nvSpPr>
+          <p:cNvPr id="42" name="TextBox 41">
+            <a:extLst>
+              <a:ext uri="{FF2B5EF4-FFF2-40B4-BE49-F238E27FC236}">
+                <a16:creationId xmlns:a16="http://schemas.microsoft.com/office/drawing/2014/main" id="{9610BCC2-16FA-ED24-3A21-478925D0DCE8}"/>
+              </a:ext>
+            </a:extLst>
+          </p:cNvPr>
+          <p:cNvSpPr txBox="1"/>
+          <p:nvPr/>
+        </p:nvSpPr>
+        <p:spPr>
+          <a:xfrm>
+            <a:off x="3207138" y="5755083"/>
+            <a:ext cx="802249" cy="230832"/>
+          </a:xfrm>
+          <a:prstGeom prst="rect">
+            <a:avLst/>
+          </a:prstGeom>
+          <a:noFill/>
+        </p:spPr>
+        <p:txBody>
+          <a:bodyPr wrap="square" rtlCol="0">
+            <a:spAutoFit/>
+          </a:bodyPr>
+          <a:lstStyle/>
+          <a:p>
+            <a:r>
+              <a:rPr lang="en-SG" sz="900" dirty="0" err="1">
+                <a:solidFill>
+                  <a:srgbClr val="002060"/>
+                </a:solidFill>
+              </a:rPr>
+              <a:t>jumphostN</a:t>
+            </a:r>
+            <a:endParaRPr lang="en-SG" sz="900" dirty="0">
+              <a:solidFill>
+                <a:srgbClr val="002060"/>
+              </a:solidFill>
+            </a:endParaRPr>
+          </a:p>
+        </p:txBody>
+      </p:sp>
+      <p:sp>
+        <p:nvSpPr>
+          <p:cNvPr id="43" name="TextBox 42">
+            <a:extLst>
+              <a:ext uri="{FF2B5EF4-FFF2-40B4-BE49-F238E27FC236}">
+                <a16:creationId xmlns:a16="http://schemas.microsoft.com/office/drawing/2014/main" id="{83B94470-B3BD-41EC-FE07-C3FE967370A5}"/>
+              </a:ext>
+            </a:extLst>
+          </p:cNvPr>
+          <p:cNvSpPr txBox="1"/>
+          <p:nvPr/>
+        </p:nvSpPr>
+        <p:spPr>
+          <a:xfrm>
+            <a:off x="1947198" y="6288540"/>
+            <a:ext cx="1890206" cy="230832"/>
+          </a:xfrm>
+          <a:prstGeom prst="rect">
+            <a:avLst/>
+          </a:prstGeom>
+          <a:noFill/>
+        </p:spPr>
+        <p:txBody>
+          <a:bodyPr wrap="square" rtlCol="0">
+            <a:spAutoFit/>
+          </a:bodyPr>
+          <a:lstStyle/>
+          <a:p>
+            <a:r>
+              <a:rPr lang="en-US" sz="900" dirty="0">
+                <a:solidFill>
+                  <a:srgbClr val="002060"/>
+                </a:solidFill>
+              </a:rPr>
+              <a:t>RemoteWebHost-1: 443</a:t>
+            </a:r>
+            <a:endParaRPr lang="en-SG" sz="900" dirty="0">
+              <a:solidFill>
+                <a:srgbClr val="002060"/>
+              </a:solidFill>
+            </a:endParaRPr>
+          </a:p>
+        </p:txBody>
+      </p:sp>
+      <p:sp>
+        <p:nvSpPr>
+          <p:cNvPr id="44" name="TextBox 43">
+            <a:extLst>
+              <a:ext uri="{FF2B5EF4-FFF2-40B4-BE49-F238E27FC236}">
+                <a16:creationId xmlns:a16="http://schemas.microsoft.com/office/drawing/2014/main" id="{5130EB6D-D4FC-2746-8FDC-9285E532C082}"/>
+              </a:ext>
+            </a:extLst>
+          </p:cNvPr>
+          <p:cNvSpPr txBox="1"/>
+          <p:nvPr/>
+        </p:nvSpPr>
+        <p:spPr>
+          <a:xfrm>
+            <a:off x="3725295" y="6448472"/>
+            <a:ext cx="1890206" cy="230832"/>
+          </a:xfrm>
+          <a:prstGeom prst="rect">
+            <a:avLst/>
+          </a:prstGeom>
+          <a:noFill/>
+        </p:spPr>
+        <p:txBody>
+          <a:bodyPr wrap="square" rtlCol="0">
+            <a:spAutoFit/>
+          </a:bodyPr>
+          <a:lstStyle/>
+          <a:p>
+            <a:r>
+              <a:rPr lang="en-US" sz="900" dirty="0">
+                <a:solidFill>
+                  <a:srgbClr val="002060"/>
+                </a:solidFill>
+              </a:rPr>
+              <a:t>RemoteWebHost-2: 8080</a:t>
+            </a:r>
+            <a:endParaRPr lang="en-SG" sz="900" dirty="0">
+              <a:solidFill>
+                <a:srgbClr val="002060"/>
+              </a:solidFill>
+            </a:endParaRPr>
+          </a:p>
+        </p:txBody>
+      </p:sp>
+      <p:sp>
+        <p:nvSpPr>
+          <p:cNvPr id="45" name="TextBox 44">
+            <a:extLst>
+              <a:ext uri="{FF2B5EF4-FFF2-40B4-BE49-F238E27FC236}">
+                <a16:creationId xmlns:a16="http://schemas.microsoft.com/office/drawing/2014/main" id="{3EBAD0EF-51BA-C523-F4E4-6E6F33E64D55}"/>
+              </a:ext>
+            </a:extLst>
+          </p:cNvPr>
+          <p:cNvSpPr txBox="1"/>
+          <p:nvPr/>
+        </p:nvSpPr>
+        <p:spPr>
+          <a:xfrm>
+            <a:off x="324379" y="4467360"/>
+            <a:ext cx="2901331" cy="646331"/>
+          </a:xfrm>
+          <a:prstGeom prst="rect">
+            <a:avLst/>
+          </a:prstGeom>
+          <a:noFill/>
+        </p:spPr>
+        <p:txBody>
+          <a:bodyPr wrap="square" rtlCol="0">
+            <a:spAutoFit/>
+          </a:bodyPr>
+          <a:lstStyle/>
+          <a:p>
+            <a:r>
+              <a:rPr lang="en-US" sz="900" dirty="0">
+                <a:solidFill>
+                  <a:srgbClr val="002060"/>
+                </a:solidFill>
+              </a:rPr>
+              <a:t>http:// 127.0.0.1:8080  &lt;= … =&gt; RemoteWebHost-3: 80</a:t>
+            </a:r>
+          </a:p>
+          <a:p>
+            <a:r>
+              <a:rPr lang="en-US" sz="900" dirty="0">
+                <a:solidFill>
+                  <a:srgbClr val="002060"/>
+                </a:solidFill>
+              </a:rPr>
+              <a:t>https:// 127.0.0.1:8081  &lt;= … =&gt; RemoteWebHost-1: 443</a:t>
+            </a:r>
+          </a:p>
+          <a:p>
+            <a:r>
+              <a:rPr lang="en-US" sz="900" dirty="0">
+                <a:solidFill>
+                  <a:srgbClr val="002060"/>
+                </a:solidFill>
+              </a:rPr>
+              <a:t>http:// 127.0.0.1:8082  &lt;= … =&gt; RemoteWebHost-3: 8080</a:t>
+            </a:r>
+          </a:p>
+          <a:p>
+            <a:r>
+              <a:rPr lang="en-US" sz="900" dirty="0">
+                <a:solidFill>
+                  <a:srgbClr val="002060"/>
+                </a:solidFill>
+              </a:rPr>
+              <a:t>https:// 127.0.0.1:8083  &lt;= … =&gt; RemoteWebHost-3: 623</a:t>
+            </a:r>
+          </a:p>
+        </p:txBody>
+      </p:sp>
+      <p:sp>
+        <p:nvSpPr>
+          <p:cNvPr id="46" name="TextBox 45">
+            <a:extLst>
+              <a:ext uri="{FF2B5EF4-FFF2-40B4-BE49-F238E27FC236}">
+                <a16:creationId xmlns:a16="http://schemas.microsoft.com/office/drawing/2014/main" id="{61C2EDF5-262D-D533-B96D-916BC15F32C3}"/>
+              </a:ext>
+            </a:extLst>
+          </p:cNvPr>
+          <p:cNvSpPr txBox="1"/>
+          <p:nvPr/>
+        </p:nvSpPr>
+        <p:spPr>
+          <a:xfrm>
+            <a:off x="972508" y="5589743"/>
+            <a:ext cx="802249" cy="230832"/>
+          </a:xfrm>
+          <a:prstGeom prst="rect">
+            <a:avLst/>
+          </a:prstGeom>
+          <a:noFill/>
+        </p:spPr>
+        <p:txBody>
+          <a:bodyPr wrap="square" rtlCol="0">
+            <a:spAutoFit/>
+          </a:bodyPr>
+          <a:lstStyle/>
+          <a:p>
+            <a:r>
+              <a:rPr lang="en-US" sz="900" dirty="0" err="1">
+                <a:solidFill>
+                  <a:srgbClr val="002060"/>
+                </a:solidFill>
+              </a:rPr>
+              <a:t>ssh</a:t>
+            </a:r>
+            <a:endParaRPr lang="en-SG" sz="900" dirty="0">
+              <a:solidFill>
+                <a:srgbClr val="002060"/>
+              </a:solidFill>
+            </a:endParaRPr>
+          </a:p>
+        </p:txBody>
+      </p:sp>
+      <p:cxnSp>
+        <p:nvCxnSpPr>
+          <p:cNvPr id="48" name="Straight Connector 47">
+            <a:extLst>
+              <a:ext uri="{FF2B5EF4-FFF2-40B4-BE49-F238E27FC236}">
+                <a16:creationId xmlns:a16="http://schemas.microsoft.com/office/drawing/2014/main" id="{A3DE38F6-BD6F-2189-4C8B-6EF2661A6003}"/>
+              </a:ext>
+            </a:extLst>
+          </p:cNvPr>
+          <p:cNvCxnSpPr>
+            <a:cxnSpLocks/>
+          </p:cNvCxnSpPr>
+          <p:nvPr/>
+        </p:nvCxnSpPr>
+        <p:spPr>
+          <a:xfrm>
+            <a:off x="1456422" y="5121765"/>
+            <a:ext cx="0" cy="1144244"/>
+          </a:xfrm>
+          <a:prstGeom prst="line">
+            <a:avLst/>
+          </a:prstGeom>
+          <a:ln>
+            <a:solidFill>
+              <a:srgbClr val="FF0000"/>
+            </a:solidFill>
+          </a:ln>
+        </p:spPr>
+        <p:style>
+          <a:lnRef idx="1">
+            <a:schemeClr val="accent1"/>
+          </a:lnRef>
+          <a:fillRef idx="0">
+            <a:schemeClr val="accent1"/>
+          </a:fillRef>
+          <a:effectRef idx="0">
+            <a:schemeClr val="accent1"/>
+          </a:effectRef>
+          <a:fontRef idx="minor">
+            <a:schemeClr val="tx1"/>
+          </a:fontRef>
+        </p:style>
+      </p:cxnSp>
+      <p:sp>
+        <p:nvSpPr>
+          <p:cNvPr id="51" name="TextBox 50">
+            <a:extLst>
+              <a:ext uri="{FF2B5EF4-FFF2-40B4-BE49-F238E27FC236}">
+                <a16:creationId xmlns:a16="http://schemas.microsoft.com/office/drawing/2014/main" id="{05951C27-10C8-2932-DBCA-70D3C2683154}"/>
+              </a:ext>
+            </a:extLst>
+          </p:cNvPr>
+          <p:cNvSpPr txBox="1"/>
+          <p:nvPr/>
+        </p:nvSpPr>
+        <p:spPr>
+          <a:xfrm>
+            <a:off x="690254" y="6295684"/>
+            <a:ext cx="1256944" cy="369332"/>
+          </a:xfrm>
+          <a:prstGeom prst="rect">
+            <a:avLst/>
+          </a:prstGeom>
+          <a:noFill/>
+        </p:spPr>
+        <p:txBody>
+          <a:bodyPr wrap="square" rtlCol="0">
+            <a:spAutoFit/>
+          </a:bodyPr>
+          <a:lstStyle/>
+          <a:p>
+            <a:r>
+              <a:rPr lang="en-US" sz="900" b="1" dirty="0">
+                <a:solidFill>
+                  <a:srgbClr val="FF0000"/>
+                </a:solidFill>
+                <a:effectLst/>
+              </a:rPr>
+              <a:t>FIREWALL (only port 22 is open</a:t>
+            </a:r>
+            <a:r>
+              <a:rPr lang="en-US" sz="900" b="0" dirty="0">
+                <a:solidFill>
+                  <a:srgbClr val="FF0000"/>
+                </a:solidFill>
+                <a:effectLst/>
+              </a:rPr>
+              <a:t>)</a:t>
             </a:r>
           </a:p>
         </p:txBody>

</xml_diff>

<commit_message>
Update the load test document.
</commit_message>
<xml_diff>
--- a/doc/designDoc.pptx
+++ b/doc/designDoc.pptx
@@ -7,6 +7,7 @@
   <p:sldIdLst>
     <p:sldId id="256" r:id="rId2"/>
     <p:sldId id="257" r:id="rId3"/>
+    <p:sldId id="258" r:id="rId4"/>
   </p:sldIdLst>
   <p:sldSz cx="12192000" cy="6858000"/>
   <p:notesSz cx="6858000" cy="9144000"/>
@@ -262,7 +263,7 @@
           <a:p>
             <a:fld id="{21CF26C0-3F45-4AEC-B024-E55C3E18A278}" type="datetimeFigureOut">
               <a:rPr lang="en-SG" smtClean="0"/>
-              <a:t>9/8/2022</a:t>
+              <a:t>26/6/2023</a:t>
             </a:fld>
             <a:endParaRPr lang="en-SG"/>
           </a:p>
@@ -462,7 +463,7 @@
           <a:p>
             <a:fld id="{21CF26C0-3F45-4AEC-B024-E55C3E18A278}" type="datetimeFigureOut">
               <a:rPr lang="en-SG" smtClean="0"/>
-              <a:t>9/8/2022</a:t>
+              <a:t>26/6/2023</a:t>
             </a:fld>
             <a:endParaRPr lang="en-SG"/>
           </a:p>
@@ -672,7 +673,7 @@
           <a:p>
             <a:fld id="{21CF26C0-3F45-4AEC-B024-E55C3E18A278}" type="datetimeFigureOut">
               <a:rPr lang="en-SG" smtClean="0"/>
-              <a:t>9/8/2022</a:t>
+              <a:t>26/6/2023</a:t>
             </a:fld>
             <a:endParaRPr lang="en-SG"/>
           </a:p>
@@ -872,7 +873,7 @@
           <a:p>
             <a:fld id="{21CF26C0-3F45-4AEC-B024-E55C3E18A278}" type="datetimeFigureOut">
               <a:rPr lang="en-SG" smtClean="0"/>
-              <a:t>9/8/2022</a:t>
+              <a:t>26/6/2023</a:t>
             </a:fld>
             <a:endParaRPr lang="en-SG"/>
           </a:p>
@@ -1148,7 +1149,7 @@
           <a:p>
             <a:fld id="{21CF26C0-3F45-4AEC-B024-E55C3E18A278}" type="datetimeFigureOut">
               <a:rPr lang="en-SG" smtClean="0"/>
-              <a:t>9/8/2022</a:t>
+              <a:t>26/6/2023</a:t>
             </a:fld>
             <a:endParaRPr lang="en-SG"/>
           </a:p>
@@ -1416,7 +1417,7 @@
           <a:p>
             <a:fld id="{21CF26C0-3F45-4AEC-B024-E55C3E18A278}" type="datetimeFigureOut">
               <a:rPr lang="en-SG" smtClean="0"/>
-              <a:t>9/8/2022</a:t>
+              <a:t>26/6/2023</a:t>
             </a:fld>
             <a:endParaRPr lang="en-SG"/>
           </a:p>
@@ -1831,7 +1832,7 @@
           <a:p>
             <a:fld id="{21CF26C0-3F45-4AEC-B024-E55C3E18A278}" type="datetimeFigureOut">
               <a:rPr lang="en-SG" smtClean="0"/>
-              <a:t>9/8/2022</a:t>
+              <a:t>26/6/2023</a:t>
             </a:fld>
             <a:endParaRPr lang="en-SG"/>
           </a:p>
@@ -1973,7 +1974,7 @@
           <a:p>
             <a:fld id="{21CF26C0-3F45-4AEC-B024-E55C3E18A278}" type="datetimeFigureOut">
               <a:rPr lang="en-SG" smtClean="0"/>
-              <a:t>9/8/2022</a:t>
+              <a:t>26/6/2023</a:t>
             </a:fld>
             <a:endParaRPr lang="en-SG"/>
           </a:p>
@@ -2086,7 +2087,7 @@
           <a:p>
             <a:fld id="{21CF26C0-3F45-4AEC-B024-E55C3E18A278}" type="datetimeFigureOut">
               <a:rPr lang="en-SG" smtClean="0"/>
-              <a:t>9/8/2022</a:t>
+              <a:t>26/6/2023</a:t>
             </a:fld>
             <a:endParaRPr lang="en-SG"/>
           </a:p>
@@ -2399,7 +2400,7 @@
           <a:p>
             <a:fld id="{21CF26C0-3F45-4AEC-B024-E55C3E18A278}" type="datetimeFigureOut">
               <a:rPr lang="en-SG" smtClean="0"/>
-              <a:t>9/8/2022</a:t>
+              <a:t>26/6/2023</a:t>
             </a:fld>
             <a:endParaRPr lang="en-SG"/>
           </a:p>
@@ -2688,7 +2689,7 @@
           <a:p>
             <a:fld id="{21CF26C0-3F45-4AEC-B024-E55C3E18A278}" type="datetimeFigureOut">
               <a:rPr lang="en-SG" smtClean="0"/>
-              <a:t>9/8/2022</a:t>
+              <a:t>26/6/2023</a:t>
             </a:fld>
             <a:endParaRPr lang="en-SG"/>
           </a:p>
@@ -2931,7 +2932,7 @@
           <a:p>
             <a:fld id="{21CF26C0-3F45-4AEC-B024-E55C3E18A278}" type="datetimeFigureOut">
               <a:rPr lang="en-SG" smtClean="0"/>
-              <a:t>9/8/2022</a:t>
+              <a:t>26/6/2023</a:t>
             </a:fld>
             <a:endParaRPr lang="en-SG"/>
           </a:p>
@@ -11398,6 +11399,1724 @@
 </p:sld>
 </file>
 
+<file path=ppt/slides/slide3.xml><?xml version="1.0" encoding="utf-8"?>
+<p:sld xmlns:a="http://schemas.openxmlformats.org/drawingml/2006/main" xmlns:r="http://schemas.openxmlformats.org/officeDocument/2006/relationships" xmlns:p="http://schemas.openxmlformats.org/presentationml/2006/main">
+  <p:cSld>
+    <p:spTree>
+      <p:nvGrpSpPr>
+        <p:cNvPr id="1" name=""/>
+        <p:cNvGrpSpPr/>
+        <p:nvPr/>
+      </p:nvGrpSpPr>
+      <p:grpSpPr>
+        <a:xfrm>
+          <a:off x="0" y="0"/>
+          <a:ext cx="0" cy="0"/>
+          <a:chOff x="0" y="0"/>
+          <a:chExt cx="0" cy="0"/>
+        </a:xfrm>
+      </p:grpSpPr>
+      <p:sp>
+        <p:nvSpPr>
+          <p:cNvPr id="32" name="Rectangle 31">
+            <a:extLst>
+              <a:ext uri="{FF2B5EF4-FFF2-40B4-BE49-F238E27FC236}">
+                <a16:creationId xmlns:a16="http://schemas.microsoft.com/office/drawing/2014/main" id="{1E269692-D51F-4FB5-809C-B1CF596CF5C4}"/>
+              </a:ext>
+            </a:extLst>
+          </p:cNvPr>
+          <p:cNvSpPr/>
+          <p:nvPr/>
+        </p:nvSpPr>
+        <p:spPr>
+          <a:xfrm>
+            <a:off x="7836487" y="1831867"/>
+            <a:ext cx="881727" cy="815723"/>
+          </a:xfrm>
+          <a:prstGeom prst="rect">
+            <a:avLst/>
+          </a:prstGeom>
+          <a:ln>
+            <a:solidFill>
+              <a:srgbClr val="0070C0"/>
+            </a:solidFill>
+            <a:prstDash val="dash"/>
+          </a:ln>
+        </p:spPr>
+        <p:style>
+          <a:lnRef idx="2">
+            <a:schemeClr val="accent6"/>
+          </a:lnRef>
+          <a:fillRef idx="1">
+            <a:schemeClr val="lt1"/>
+          </a:fillRef>
+          <a:effectRef idx="0">
+            <a:schemeClr val="accent6"/>
+          </a:effectRef>
+          <a:fontRef idx="minor">
+            <a:schemeClr val="dk1"/>
+          </a:fontRef>
+        </p:style>
+        <p:txBody>
+          <a:bodyPr rtlCol="0" anchor="ctr"/>
+          <a:lstStyle/>
+          <a:p>
+            <a:pPr algn="ctr"/>
+            <a:endParaRPr lang="en-SG" dirty="0"/>
+          </a:p>
+        </p:txBody>
+      </p:sp>
+      <p:sp>
+        <p:nvSpPr>
+          <p:cNvPr id="4" name="TextBox 3">
+            <a:extLst>
+              <a:ext uri="{FF2B5EF4-FFF2-40B4-BE49-F238E27FC236}">
+                <a16:creationId xmlns:a16="http://schemas.microsoft.com/office/drawing/2014/main" id="{110CB7E1-58EE-E973-B907-3DE916B15C94}"/>
+              </a:ext>
+            </a:extLst>
+          </p:cNvPr>
+          <p:cNvSpPr txBox="1"/>
+          <p:nvPr/>
+        </p:nvSpPr>
+        <p:spPr>
+          <a:xfrm>
+            <a:off x="1664496" y="1777556"/>
+            <a:ext cx="822672" cy="246221"/>
+          </a:xfrm>
+          <a:prstGeom prst="rect">
+            <a:avLst/>
+          </a:prstGeom>
+          <a:noFill/>
+          <a:ln w="12700">
+            <a:solidFill>
+              <a:schemeClr val="tx1"/>
+            </a:solidFill>
+            <a:prstDash val="solid"/>
+          </a:ln>
+        </p:spPr>
+        <p:txBody>
+          <a:bodyPr wrap="square" rtlCol="0">
+            <a:spAutoFit/>
+          </a:bodyPr>
+          <a:lstStyle/>
+          <a:p>
+            <a:r>
+              <a:rPr lang="en-SG" sz="1000" b="1" dirty="0"/>
+              <a:t>Load tester</a:t>
+            </a:r>
+          </a:p>
+        </p:txBody>
+      </p:sp>
+      <p:cxnSp>
+        <p:nvCxnSpPr>
+          <p:cNvPr id="5" name="Straight Arrow Connector 4">
+            <a:extLst>
+              <a:ext uri="{FF2B5EF4-FFF2-40B4-BE49-F238E27FC236}">
+                <a16:creationId xmlns:a16="http://schemas.microsoft.com/office/drawing/2014/main" id="{E7BD9D0F-D208-D29C-0084-CB69576BD2B7}"/>
+              </a:ext>
+            </a:extLst>
+          </p:cNvPr>
+          <p:cNvCxnSpPr>
+            <a:cxnSpLocks/>
+          </p:cNvCxnSpPr>
+          <p:nvPr/>
+        </p:nvCxnSpPr>
+        <p:spPr>
+          <a:xfrm>
+            <a:off x="2487168" y="1900666"/>
+            <a:ext cx="429768" cy="0"/>
+          </a:xfrm>
+          <a:prstGeom prst="straightConnector1">
+            <a:avLst/>
+          </a:prstGeom>
+          <a:ln w="19050">
+            <a:tailEnd type="triangle"/>
+          </a:ln>
+        </p:spPr>
+        <p:style>
+          <a:lnRef idx="1">
+            <a:schemeClr val="accent1"/>
+          </a:lnRef>
+          <a:fillRef idx="0">
+            <a:schemeClr val="accent1"/>
+          </a:fillRef>
+          <a:effectRef idx="0">
+            <a:schemeClr val="accent1"/>
+          </a:effectRef>
+          <a:fontRef idx="minor">
+            <a:schemeClr val="tx1"/>
+          </a:fontRef>
+        </p:style>
+      </p:cxnSp>
+      <p:sp>
+        <p:nvSpPr>
+          <p:cNvPr id="7" name="TextBox 6">
+            <a:extLst>
+              <a:ext uri="{FF2B5EF4-FFF2-40B4-BE49-F238E27FC236}">
+                <a16:creationId xmlns:a16="http://schemas.microsoft.com/office/drawing/2014/main" id="{30E24429-7323-492F-8B57-1568C6322CD7}"/>
+              </a:ext>
+            </a:extLst>
+          </p:cNvPr>
+          <p:cNvSpPr txBox="1"/>
+          <p:nvPr/>
+        </p:nvSpPr>
+        <p:spPr>
+          <a:xfrm>
+            <a:off x="2916936" y="1777555"/>
+            <a:ext cx="822672" cy="246221"/>
+          </a:xfrm>
+          <a:prstGeom prst="rect">
+            <a:avLst/>
+          </a:prstGeom>
+          <a:noFill/>
+          <a:ln w="12700">
+            <a:solidFill>
+              <a:schemeClr val="tx1"/>
+            </a:solidFill>
+            <a:prstDash val="solid"/>
+          </a:ln>
+        </p:spPr>
+        <p:txBody>
+          <a:bodyPr wrap="square" rtlCol="0">
+            <a:spAutoFit/>
+          </a:bodyPr>
+          <a:lstStyle/>
+          <a:p>
+            <a:r>
+              <a:rPr lang="en-SG" sz="1000" b="1" dirty="0"/>
+              <a:t>Team tester</a:t>
+            </a:r>
+          </a:p>
+        </p:txBody>
+      </p:sp>
+      <p:cxnSp>
+        <p:nvCxnSpPr>
+          <p:cNvPr id="8" name="Straight Arrow Connector 7">
+            <a:extLst>
+              <a:ext uri="{FF2B5EF4-FFF2-40B4-BE49-F238E27FC236}">
+                <a16:creationId xmlns:a16="http://schemas.microsoft.com/office/drawing/2014/main" id="{DFA65867-A8F7-1C88-FC56-CFA87A3EC520}"/>
+              </a:ext>
+            </a:extLst>
+          </p:cNvPr>
+          <p:cNvCxnSpPr>
+            <a:cxnSpLocks/>
+          </p:cNvCxnSpPr>
+          <p:nvPr/>
+        </p:nvCxnSpPr>
+        <p:spPr>
+          <a:xfrm>
+            <a:off x="2487168" y="1900665"/>
+            <a:ext cx="429768" cy="540783"/>
+          </a:xfrm>
+          <a:prstGeom prst="straightConnector1">
+            <a:avLst/>
+          </a:prstGeom>
+          <a:ln w="19050">
+            <a:tailEnd type="triangle"/>
+          </a:ln>
+        </p:spPr>
+        <p:style>
+          <a:lnRef idx="1">
+            <a:schemeClr val="accent1"/>
+          </a:lnRef>
+          <a:fillRef idx="0">
+            <a:schemeClr val="accent1"/>
+          </a:fillRef>
+          <a:effectRef idx="0">
+            <a:schemeClr val="accent1"/>
+          </a:effectRef>
+          <a:fontRef idx="minor">
+            <a:schemeClr val="tx1"/>
+          </a:fontRef>
+        </p:style>
+      </p:cxnSp>
+      <p:sp>
+        <p:nvSpPr>
+          <p:cNvPr id="11" name="TextBox 10">
+            <a:extLst>
+              <a:ext uri="{FF2B5EF4-FFF2-40B4-BE49-F238E27FC236}">
+                <a16:creationId xmlns:a16="http://schemas.microsoft.com/office/drawing/2014/main" id="{181A3E75-3E46-4C83-EEF7-84B565958FD0}"/>
+              </a:ext>
+            </a:extLst>
+          </p:cNvPr>
+          <p:cNvSpPr txBox="1"/>
+          <p:nvPr/>
+        </p:nvSpPr>
+        <p:spPr>
+          <a:xfrm>
+            <a:off x="2916936" y="2271331"/>
+            <a:ext cx="822672" cy="246221"/>
+          </a:xfrm>
+          <a:prstGeom prst="rect">
+            <a:avLst/>
+          </a:prstGeom>
+          <a:noFill/>
+          <a:ln w="12700">
+            <a:solidFill>
+              <a:schemeClr val="tx1"/>
+            </a:solidFill>
+            <a:prstDash val="solid"/>
+          </a:ln>
+        </p:spPr>
+        <p:txBody>
+          <a:bodyPr wrap="square" rtlCol="0">
+            <a:spAutoFit/>
+          </a:bodyPr>
+          <a:lstStyle/>
+          <a:p>
+            <a:r>
+              <a:rPr lang="en-SG" sz="1000" b="1" dirty="0"/>
+              <a:t>Team tester</a:t>
+            </a:r>
+          </a:p>
+        </p:txBody>
+      </p:sp>
+      <p:sp>
+        <p:nvSpPr>
+          <p:cNvPr id="12" name="TextBox 11">
+            <a:extLst>
+              <a:ext uri="{FF2B5EF4-FFF2-40B4-BE49-F238E27FC236}">
+                <a16:creationId xmlns:a16="http://schemas.microsoft.com/office/drawing/2014/main" id="{6C70A98F-D138-5F2D-278D-295BF45963C9}"/>
+              </a:ext>
+            </a:extLst>
+          </p:cNvPr>
+          <p:cNvSpPr txBox="1"/>
+          <p:nvPr/>
+        </p:nvSpPr>
+        <p:spPr>
+          <a:xfrm>
+            <a:off x="3128741" y="1926312"/>
+            <a:ext cx="362198" cy="369332"/>
+          </a:xfrm>
+          <a:prstGeom prst="rect">
+            <a:avLst/>
+          </a:prstGeom>
+          <a:noFill/>
+        </p:spPr>
+        <p:txBody>
+          <a:bodyPr wrap="square" rtlCol="0">
+            <a:spAutoFit/>
+          </a:bodyPr>
+          <a:lstStyle/>
+          <a:p>
+            <a:r>
+              <a:rPr lang="en-US" dirty="0"/>
+              <a:t>…</a:t>
+            </a:r>
+          </a:p>
+        </p:txBody>
+      </p:sp>
+      <p:cxnSp>
+        <p:nvCxnSpPr>
+          <p:cNvPr id="13" name="Straight Arrow Connector 12">
+            <a:extLst>
+              <a:ext uri="{FF2B5EF4-FFF2-40B4-BE49-F238E27FC236}">
+                <a16:creationId xmlns:a16="http://schemas.microsoft.com/office/drawing/2014/main" id="{A43325EE-766A-C24D-6E1E-D449E5FF4C2F}"/>
+              </a:ext>
+            </a:extLst>
+          </p:cNvPr>
+          <p:cNvCxnSpPr>
+            <a:cxnSpLocks/>
+          </p:cNvCxnSpPr>
+          <p:nvPr/>
+        </p:nvCxnSpPr>
+        <p:spPr>
+          <a:xfrm>
+            <a:off x="3739608" y="1921978"/>
+            <a:ext cx="429768" cy="0"/>
+          </a:xfrm>
+          <a:prstGeom prst="straightConnector1">
+            <a:avLst/>
+          </a:prstGeom>
+          <a:ln w="19050">
+            <a:tailEnd type="triangle"/>
+          </a:ln>
+        </p:spPr>
+        <p:style>
+          <a:lnRef idx="1">
+            <a:schemeClr val="accent1"/>
+          </a:lnRef>
+          <a:fillRef idx="0">
+            <a:schemeClr val="accent1"/>
+          </a:fillRef>
+          <a:effectRef idx="0">
+            <a:schemeClr val="accent1"/>
+          </a:effectRef>
+          <a:fontRef idx="minor">
+            <a:schemeClr val="tx1"/>
+          </a:fontRef>
+        </p:style>
+      </p:cxnSp>
+      <p:sp>
+        <p:nvSpPr>
+          <p:cNvPr id="14" name="Rectangle 13">
+            <a:extLst>
+              <a:ext uri="{FF2B5EF4-FFF2-40B4-BE49-F238E27FC236}">
+                <a16:creationId xmlns:a16="http://schemas.microsoft.com/office/drawing/2014/main" id="{26AF511A-514F-6AEC-7720-92AE293E78B2}"/>
+              </a:ext>
+            </a:extLst>
+          </p:cNvPr>
+          <p:cNvSpPr/>
+          <p:nvPr/>
+        </p:nvSpPr>
+        <p:spPr>
+          <a:xfrm>
+            <a:off x="4172938" y="1781173"/>
+            <a:ext cx="1249263" cy="815723"/>
+          </a:xfrm>
+          <a:prstGeom prst="rect">
+            <a:avLst/>
+          </a:prstGeom>
+          <a:ln>
+            <a:solidFill>
+              <a:srgbClr val="0070C0"/>
+            </a:solidFill>
+            <a:prstDash val="dash"/>
+          </a:ln>
+        </p:spPr>
+        <p:style>
+          <a:lnRef idx="2">
+            <a:schemeClr val="accent6"/>
+          </a:lnRef>
+          <a:fillRef idx="1">
+            <a:schemeClr val="lt1"/>
+          </a:fillRef>
+          <a:effectRef idx="0">
+            <a:schemeClr val="accent6"/>
+          </a:effectRef>
+          <a:fontRef idx="minor">
+            <a:schemeClr val="dk1"/>
+          </a:fontRef>
+        </p:style>
+        <p:txBody>
+          <a:bodyPr rtlCol="0" anchor="ctr"/>
+          <a:lstStyle/>
+          <a:p>
+            <a:pPr algn="ctr"/>
+            <a:endParaRPr lang="en-SG" dirty="0"/>
+          </a:p>
+        </p:txBody>
+      </p:sp>
+      <p:sp>
+        <p:nvSpPr>
+          <p:cNvPr id="15" name="TextBox 14">
+            <a:extLst>
+              <a:ext uri="{FF2B5EF4-FFF2-40B4-BE49-F238E27FC236}">
+                <a16:creationId xmlns:a16="http://schemas.microsoft.com/office/drawing/2014/main" id="{19BD4D87-2DE7-88A0-A388-B34F0AC93F39}"/>
+              </a:ext>
+            </a:extLst>
+          </p:cNvPr>
+          <p:cNvSpPr txBox="1"/>
+          <p:nvPr/>
+        </p:nvSpPr>
+        <p:spPr>
+          <a:xfrm>
+            <a:off x="4086890" y="1563960"/>
+            <a:ext cx="988029" cy="230832"/>
+          </a:xfrm>
+          <a:prstGeom prst="rect">
+            <a:avLst/>
+          </a:prstGeom>
+          <a:noFill/>
+        </p:spPr>
+        <p:txBody>
+          <a:bodyPr wrap="square" rtlCol="0">
+            <a:spAutoFit/>
+          </a:bodyPr>
+          <a:lstStyle/>
+          <a:p>
+            <a:r>
+              <a:rPr lang="en-SG" sz="900" dirty="0">
+                <a:solidFill>
+                  <a:srgbClr val="002060"/>
+                </a:solidFill>
+              </a:rPr>
+              <a:t>Threads Pool</a:t>
+            </a:r>
+          </a:p>
+        </p:txBody>
+      </p:sp>
+      <p:sp>
+        <p:nvSpPr>
+          <p:cNvPr id="16" name="TextBox 15">
+            <a:extLst>
+              <a:ext uri="{FF2B5EF4-FFF2-40B4-BE49-F238E27FC236}">
+                <a16:creationId xmlns:a16="http://schemas.microsoft.com/office/drawing/2014/main" id="{FBFAD6E9-8BBA-E80E-2C1A-150AA18A8DB2}"/>
+              </a:ext>
+            </a:extLst>
+          </p:cNvPr>
+          <p:cNvSpPr txBox="1"/>
+          <p:nvPr/>
+        </p:nvSpPr>
+        <p:spPr>
+          <a:xfrm>
+            <a:off x="4313611" y="1864757"/>
+            <a:ext cx="822672" cy="246221"/>
+          </a:xfrm>
+          <a:prstGeom prst="rect">
+            <a:avLst/>
+          </a:prstGeom>
+          <a:noFill/>
+          <a:ln w="12700">
+            <a:solidFill>
+              <a:schemeClr val="tx1"/>
+            </a:solidFill>
+            <a:prstDash val="solid"/>
+          </a:ln>
+        </p:spPr>
+        <p:txBody>
+          <a:bodyPr wrap="square" rtlCol="0">
+            <a:spAutoFit/>
+          </a:bodyPr>
+          <a:lstStyle/>
+          <a:p>
+            <a:r>
+              <a:rPr lang="en-SG" sz="1000" b="1" dirty="0"/>
+              <a:t>User tester</a:t>
+            </a:r>
+          </a:p>
+        </p:txBody>
+      </p:sp>
+      <p:sp>
+        <p:nvSpPr>
+          <p:cNvPr id="18" name="TextBox 17">
+            <a:extLst>
+              <a:ext uri="{FF2B5EF4-FFF2-40B4-BE49-F238E27FC236}">
+                <a16:creationId xmlns:a16="http://schemas.microsoft.com/office/drawing/2014/main" id="{0E22F415-98A3-1780-82B1-33B64E608929}"/>
+              </a:ext>
+            </a:extLst>
+          </p:cNvPr>
+          <p:cNvSpPr txBox="1"/>
+          <p:nvPr/>
+        </p:nvSpPr>
+        <p:spPr>
+          <a:xfrm>
+            <a:off x="4591731" y="1996277"/>
+            <a:ext cx="362198" cy="369332"/>
+          </a:xfrm>
+          <a:prstGeom prst="rect">
+            <a:avLst/>
+          </a:prstGeom>
+          <a:noFill/>
+        </p:spPr>
+        <p:txBody>
+          <a:bodyPr wrap="square" rtlCol="0">
+            <a:spAutoFit/>
+          </a:bodyPr>
+          <a:lstStyle/>
+          <a:p>
+            <a:r>
+              <a:rPr lang="en-US" dirty="0"/>
+              <a:t>…</a:t>
+            </a:r>
+          </a:p>
+        </p:txBody>
+      </p:sp>
+      <p:sp>
+        <p:nvSpPr>
+          <p:cNvPr id="19" name="TextBox 18">
+            <a:extLst>
+              <a:ext uri="{FF2B5EF4-FFF2-40B4-BE49-F238E27FC236}">
+                <a16:creationId xmlns:a16="http://schemas.microsoft.com/office/drawing/2014/main" id="{EC2D86D8-B902-315F-9CDC-48FF61A12BD2}"/>
+              </a:ext>
+            </a:extLst>
+          </p:cNvPr>
+          <p:cNvSpPr txBox="1"/>
+          <p:nvPr/>
+        </p:nvSpPr>
+        <p:spPr>
+          <a:xfrm>
+            <a:off x="4329254" y="2295644"/>
+            <a:ext cx="822672" cy="246221"/>
+          </a:xfrm>
+          <a:prstGeom prst="rect">
+            <a:avLst/>
+          </a:prstGeom>
+          <a:noFill/>
+          <a:ln w="12700">
+            <a:solidFill>
+              <a:schemeClr val="tx1"/>
+            </a:solidFill>
+            <a:prstDash val="solid"/>
+          </a:ln>
+        </p:spPr>
+        <p:txBody>
+          <a:bodyPr wrap="square" rtlCol="0">
+            <a:spAutoFit/>
+          </a:bodyPr>
+          <a:lstStyle/>
+          <a:p>
+            <a:r>
+              <a:rPr lang="en-SG" sz="1000" b="1" dirty="0"/>
+              <a:t>User tester</a:t>
+            </a:r>
+          </a:p>
+        </p:txBody>
+      </p:sp>
+      <p:cxnSp>
+        <p:nvCxnSpPr>
+          <p:cNvPr id="20" name="Straight Arrow Connector 19">
+            <a:extLst>
+              <a:ext uri="{FF2B5EF4-FFF2-40B4-BE49-F238E27FC236}">
+                <a16:creationId xmlns:a16="http://schemas.microsoft.com/office/drawing/2014/main" id="{2043096B-D890-2752-C190-901C3AB1B31F}"/>
+              </a:ext>
+            </a:extLst>
+          </p:cNvPr>
+          <p:cNvCxnSpPr>
+            <a:cxnSpLocks/>
+            <a:stCxn id="16" idx="3"/>
+          </p:cNvCxnSpPr>
+          <p:nvPr/>
+        </p:nvCxnSpPr>
+        <p:spPr>
+          <a:xfrm>
+            <a:off x="5136283" y="1987868"/>
+            <a:ext cx="633581" cy="0"/>
+          </a:xfrm>
+          <a:prstGeom prst="straightConnector1">
+            <a:avLst/>
+          </a:prstGeom>
+          <a:ln w="19050">
+            <a:tailEnd type="triangle"/>
+          </a:ln>
+        </p:spPr>
+        <p:style>
+          <a:lnRef idx="1">
+            <a:schemeClr val="accent1"/>
+          </a:lnRef>
+          <a:fillRef idx="0">
+            <a:schemeClr val="accent1"/>
+          </a:fillRef>
+          <a:effectRef idx="0">
+            <a:schemeClr val="accent1"/>
+          </a:effectRef>
+          <a:fontRef idx="minor">
+            <a:schemeClr val="tx1"/>
+          </a:fontRef>
+        </p:style>
+      </p:cxnSp>
+      <p:pic>
+        <p:nvPicPr>
+          <p:cNvPr id="24" name="Picture 23">
+            <a:extLst>
+              <a:ext uri="{FF2B5EF4-FFF2-40B4-BE49-F238E27FC236}">
+                <a16:creationId xmlns:a16="http://schemas.microsoft.com/office/drawing/2014/main" id="{24CAFC28-D9C1-36E0-3C42-2AC9E59C71D3}"/>
+              </a:ext>
+            </a:extLst>
+          </p:cNvPr>
+          <p:cNvPicPr>
+            <a:picLocks noChangeAspect="1"/>
+          </p:cNvPicPr>
+          <p:nvPr/>
+        </p:nvPicPr>
+        <p:blipFill>
+          <a:blip r:embed="rId2"/>
+          <a:stretch>
+            <a:fillRect/>
+          </a:stretch>
+        </p:blipFill>
+        <p:spPr>
+          <a:xfrm>
+            <a:off x="5840994" y="1892971"/>
+            <a:ext cx="357596" cy="261610"/>
+          </a:xfrm>
+          <a:prstGeom prst="rect">
+            <a:avLst/>
+          </a:prstGeom>
+          <a:ln w="3175">
+            <a:solidFill>
+              <a:schemeClr val="tx1"/>
+            </a:solidFill>
+          </a:ln>
+        </p:spPr>
+      </p:pic>
+      <p:sp>
+        <p:nvSpPr>
+          <p:cNvPr id="25" name="TextBox 24">
+            <a:extLst>
+              <a:ext uri="{FF2B5EF4-FFF2-40B4-BE49-F238E27FC236}">
+                <a16:creationId xmlns:a16="http://schemas.microsoft.com/office/drawing/2014/main" id="{DF6479E3-59C7-C13D-4CE5-7B76A7804D99}"/>
+              </a:ext>
+            </a:extLst>
+          </p:cNvPr>
+          <p:cNvSpPr txBox="1"/>
+          <p:nvPr/>
+        </p:nvSpPr>
+        <p:spPr>
+          <a:xfrm>
+            <a:off x="5617737" y="1613299"/>
+            <a:ext cx="988029" cy="230832"/>
+          </a:xfrm>
+          <a:prstGeom prst="rect">
+            <a:avLst/>
+          </a:prstGeom>
+          <a:noFill/>
+        </p:spPr>
+        <p:txBody>
+          <a:bodyPr wrap="square" rtlCol="0">
+            <a:spAutoFit/>
+          </a:bodyPr>
+          <a:lstStyle/>
+          <a:p>
+            <a:r>
+              <a:rPr lang="en-SG" sz="900" dirty="0">
+                <a:solidFill>
+                  <a:srgbClr val="002060"/>
+                </a:solidFill>
+              </a:rPr>
+              <a:t>NCL gateway</a:t>
+            </a:r>
+          </a:p>
+        </p:txBody>
+      </p:sp>
+      <p:cxnSp>
+        <p:nvCxnSpPr>
+          <p:cNvPr id="26" name="Straight Arrow Connector 25">
+            <a:extLst>
+              <a:ext uri="{FF2B5EF4-FFF2-40B4-BE49-F238E27FC236}">
+                <a16:creationId xmlns:a16="http://schemas.microsoft.com/office/drawing/2014/main" id="{CEDABCB2-2039-0084-AD44-6FCDC3FD3955}"/>
+              </a:ext>
+            </a:extLst>
+          </p:cNvPr>
+          <p:cNvCxnSpPr>
+            <a:cxnSpLocks/>
+          </p:cNvCxnSpPr>
+          <p:nvPr/>
+        </p:nvCxnSpPr>
+        <p:spPr>
+          <a:xfrm>
+            <a:off x="6226022" y="1996277"/>
+            <a:ext cx="633581" cy="0"/>
+          </a:xfrm>
+          <a:prstGeom prst="straightConnector1">
+            <a:avLst/>
+          </a:prstGeom>
+          <a:ln w="19050">
+            <a:tailEnd type="triangle"/>
+          </a:ln>
+        </p:spPr>
+        <p:style>
+          <a:lnRef idx="1">
+            <a:schemeClr val="accent1"/>
+          </a:lnRef>
+          <a:fillRef idx="0">
+            <a:schemeClr val="accent1"/>
+          </a:fillRef>
+          <a:effectRef idx="0">
+            <a:schemeClr val="accent1"/>
+          </a:effectRef>
+          <a:fontRef idx="minor">
+            <a:schemeClr val="tx1"/>
+          </a:fontRef>
+        </p:style>
+      </p:cxnSp>
+      <p:pic>
+        <p:nvPicPr>
+          <p:cNvPr id="28" name="Picture 27">
+            <a:extLst>
+              <a:ext uri="{FF2B5EF4-FFF2-40B4-BE49-F238E27FC236}">
+                <a16:creationId xmlns:a16="http://schemas.microsoft.com/office/drawing/2014/main" id="{800A9A95-9A20-EB84-E763-08FB0E22D9E6}"/>
+              </a:ext>
+            </a:extLst>
+          </p:cNvPr>
+          <p:cNvPicPr>
+            <a:picLocks noChangeAspect="1"/>
+          </p:cNvPicPr>
+          <p:nvPr/>
+        </p:nvPicPr>
+        <p:blipFill>
+          <a:blip r:embed="rId3"/>
+          <a:stretch>
+            <a:fillRect/>
+          </a:stretch>
+        </p:blipFill>
+        <p:spPr>
+          <a:xfrm>
+            <a:off x="6954150" y="1857066"/>
+            <a:ext cx="471234" cy="333420"/>
+          </a:xfrm>
+          <a:prstGeom prst="rect">
+            <a:avLst/>
+          </a:prstGeom>
+        </p:spPr>
+      </p:pic>
+      <p:sp>
+        <p:nvSpPr>
+          <p:cNvPr id="29" name="TextBox 28">
+            <a:extLst>
+              <a:ext uri="{FF2B5EF4-FFF2-40B4-BE49-F238E27FC236}">
+                <a16:creationId xmlns:a16="http://schemas.microsoft.com/office/drawing/2014/main" id="{19A15163-75CF-D937-B9AE-AB26231E3DF9}"/>
+              </a:ext>
+            </a:extLst>
+          </p:cNvPr>
+          <p:cNvSpPr txBox="1"/>
+          <p:nvPr/>
+        </p:nvSpPr>
+        <p:spPr>
+          <a:xfrm>
+            <a:off x="6742156" y="1601815"/>
+            <a:ext cx="988029" cy="230832"/>
+          </a:xfrm>
+          <a:prstGeom prst="rect">
+            <a:avLst/>
+          </a:prstGeom>
+          <a:noFill/>
+        </p:spPr>
+        <p:txBody>
+          <a:bodyPr wrap="square" rtlCol="0">
+            <a:spAutoFit/>
+          </a:bodyPr>
+          <a:lstStyle/>
+          <a:p>
+            <a:r>
+              <a:rPr lang="en-SG" sz="900" dirty="0">
+                <a:solidFill>
+                  <a:srgbClr val="002060"/>
+                </a:solidFill>
+              </a:rPr>
+              <a:t>NCL firewall</a:t>
+            </a:r>
+          </a:p>
+        </p:txBody>
+      </p:sp>
+      <p:cxnSp>
+        <p:nvCxnSpPr>
+          <p:cNvPr id="30" name="Straight Arrow Connector 29">
+            <a:extLst>
+              <a:ext uri="{FF2B5EF4-FFF2-40B4-BE49-F238E27FC236}">
+                <a16:creationId xmlns:a16="http://schemas.microsoft.com/office/drawing/2014/main" id="{30B76974-9E85-0784-0906-0CA90EA81D1D}"/>
+              </a:ext>
+            </a:extLst>
+          </p:cNvPr>
+          <p:cNvCxnSpPr>
+            <a:cxnSpLocks/>
+          </p:cNvCxnSpPr>
+          <p:nvPr/>
+        </p:nvCxnSpPr>
+        <p:spPr>
+          <a:xfrm>
+            <a:off x="7472540" y="2023776"/>
+            <a:ext cx="633581" cy="0"/>
+          </a:xfrm>
+          <a:prstGeom prst="straightConnector1">
+            <a:avLst/>
+          </a:prstGeom>
+          <a:ln w="19050">
+            <a:tailEnd type="triangle"/>
+          </a:ln>
+        </p:spPr>
+        <p:style>
+          <a:lnRef idx="1">
+            <a:schemeClr val="accent1"/>
+          </a:lnRef>
+          <a:fillRef idx="0">
+            <a:schemeClr val="accent1"/>
+          </a:fillRef>
+          <a:effectRef idx="0">
+            <a:schemeClr val="accent1"/>
+          </a:effectRef>
+          <a:fontRef idx="minor">
+            <a:schemeClr val="tx1"/>
+          </a:fontRef>
+        </p:style>
+      </p:cxnSp>
+      <p:pic>
+        <p:nvPicPr>
+          <p:cNvPr id="31" name="Picture 30">
+            <a:extLst>
+              <a:ext uri="{FF2B5EF4-FFF2-40B4-BE49-F238E27FC236}">
+                <a16:creationId xmlns:a16="http://schemas.microsoft.com/office/drawing/2014/main" id="{0579A18A-3808-261F-D664-02FA49AFED72}"/>
+              </a:ext>
+            </a:extLst>
+          </p:cNvPr>
+          <p:cNvPicPr>
+            <a:picLocks noChangeAspect="1"/>
+          </p:cNvPicPr>
+          <p:nvPr/>
+        </p:nvPicPr>
+        <p:blipFill>
+          <a:blip r:embed="rId4"/>
+          <a:stretch>
+            <a:fillRect/>
+          </a:stretch>
+        </p:blipFill>
+        <p:spPr>
+          <a:xfrm>
+            <a:off x="8153277" y="1932006"/>
+            <a:ext cx="324269" cy="222575"/>
+          </a:xfrm>
+          <a:prstGeom prst="rect">
+            <a:avLst/>
+          </a:prstGeom>
+        </p:spPr>
+      </p:pic>
+      <p:cxnSp>
+        <p:nvCxnSpPr>
+          <p:cNvPr id="33" name="Straight Arrow Connector 32">
+            <a:extLst>
+              <a:ext uri="{FF2B5EF4-FFF2-40B4-BE49-F238E27FC236}">
+                <a16:creationId xmlns:a16="http://schemas.microsoft.com/office/drawing/2014/main" id="{20CDE03C-60A2-8FEE-DDDF-8CEB7F316D33}"/>
+              </a:ext>
+            </a:extLst>
+          </p:cNvPr>
+          <p:cNvCxnSpPr>
+            <a:cxnSpLocks/>
+          </p:cNvCxnSpPr>
+          <p:nvPr/>
+        </p:nvCxnSpPr>
+        <p:spPr>
+          <a:xfrm flipV="1">
+            <a:off x="5151926" y="2110978"/>
+            <a:ext cx="617938" cy="330374"/>
+          </a:xfrm>
+          <a:prstGeom prst="straightConnector1">
+            <a:avLst/>
+          </a:prstGeom>
+          <a:ln w="19050">
+            <a:tailEnd type="triangle"/>
+          </a:ln>
+        </p:spPr>
+        <p:style>
+          <a:lnRef idx="1">
+            <a:schemeClr val="accent1"/>
+          </a:lnRef>
+          <a:fillRef idx="0">
+            <a:schemeClr val="accent1"/>
+          </a:fillRef>
+          <a:effectRef idx="0">
+            <a:schemeClr val="accent1"/>
+          </a:effectRef>
+          <a:fontRef idx="minor">
+            <a:schemeClr val="tx1"/>
+          </a:fontRef>
+        </p:style>
+      </p:cxnSp>
+      <p:cxnSp>
+        <p:nvCxnSpPr>
+          <p:cNvPr id="35" name="Straight Arrow Connector 34">
+            <a:extLst>
+              <a:ext uri="{FF2B5EF4-FFF2-40B4-BE49-F238E27FC236}">
+                <a16:creationId xmlns:a16="http://schemas.microsoft.com/office/drawing/2014/main" id="{FC13E8DE-FB57-2DE3-7D23-D00646EBA663}"/>
+              </a:ext>
+            </a:extLst>
+          </p:cNvPr>
+          <p:cNvCxnSpPr>
+            <a:cxnSpLocks/>
+          </p:cNvCxnSpPr>
+          <p:nvPr/>
+        </p:nvCxnSpPr>
+        <p:spPr>
+          <a:xfrm>
+            <a:off x="6216878" y="2110978"/>
+            <a:ext cx="633581" cy="0"/>
+          </a:xfrm>
+          <a:prstGeom prst="straightConnector1">
+            <a:avLst/>
+          </a:prstGeom>
+          <a:ln w="19050">
+            <a:tailEnd type="triangle"/>
+          </a:ln>
+        </p:spPr>
+        <p:style>
+          <a:lnRef idx="1">
+            <a:schemeClr val="accent1"/>
+          </a:lnRef>
+          <a:fillRef idx="0">
+            <a:schemeClr val="accent1"/>
+          </a:fillRef>
+          <a:effectRef idx="0">
+            <a:schemeClr val="accent1"/>
+          </a:effectRef>
+          <a:fontRef idx="minor">
+            <a:schemeClr val="tx1"/>
+          </a:fontRef>
+        </p:style>
+      </p:cxnSp>
+      <p:cxnSp>
+        <p:nvCxnSpPr>
+          <p:cNvPr id="38" name="Straight Arrow Connector 37">
+            <a:extLst>
+              <a:ext uri="{FF2B5EF4-FFF2-40B4-BE49-F238E27FC236}">
+                <a16:creationId xmlns:a16="http://schemas.microsoft.com/office/drawing/2014/main" id="{A99CA486-58AD-B530-8600-FFC27EE28630}"/>
+              </a:ext>
+            </a:extLst>
+          </p:cNvPr>
+          <p:cNvCxnSpPr>
+            <a:cxnSpLocks/>
+          </p:cNvCxnSpPr>
+          <p:nvPr/>
+        </p:nvCxnSpPr>
+        <p:spPr>
+          <a:xfrm>
+            <a:off x="7472540" y="2144885"/>
+            <a:ext cx="680737" cy="237811"/>
+          </a:xfrm>
+          <a:prstGeom prst="straightConnector1">
+            <a:avLst/>
+          </a:prstGeom>
+          <a:ln w="19050">
+            <a:tailEnd type="triangle"/>
+          </a:ln>
+        </p:spPr>
+        <p:style>
+          <a:lnRef idx="1">
+            <a:schemeClr val="accent1"/>
+          </a:lnRef>
+          <a:fillRef idx="0">
+            <a:schemeClr val="accent1"/>
+          </a:fillRef>
+          <a:effectRef idx="0">
+            <a:schemeClr val="accent1"/>
+          </a:effectRef>
+          <a:fontRef idx="minor">
+            <a:schemeClr val="tx1"/>
+          </a:fontRef>
+        </p:style>
+      </p:cxnSp>
+      <p:pic>
+        <p:nvPicPr>
+          <p:cNvPr id="40" name="Picture 39">
+            <a:extLst>
+              <a:ext uri="{FF2B5EF4-FFF2-40B4-BE49-F238E27FC236}">
+                <a16:creationId xmlns:a16="http://schemas.microsoft.com/office/drawing/2014/main" id="{B835C40D-689E-6D21-60BC-F9F53CE868B2}"/>
+              </a:ext>
+            </a:extLst>
+          </p:cNvPr>
+          <p:cNvPicPr>
+            <a:picLocks noChangeAspect="1"/>
+          </p:cNvPicPr>
+          <p:nvPr/>
+        </p:nvPicPr>
+        <p:blipFill>
+          <a:blip r:embed="rId4"/>
+          <a:stretch>
+            <a:fillRect/>
+          </a:stretch>
+        </p:blipFill>
+        <p:spPr>
+          <a:xfrm>
+            <a:off x="8184150" y="2307466"/>
+            <a:ext cx="324269" cy="222575"/>
+          </a:xfrm>
+          <a:prstGeom prst="rect">
+            <a:avLst/>
+          </a:prstGeom>
+        </p:spPr>
+      </p:pic>
+      <p:sp>
+        <p:nvSpPr>
+          <p:cNvPr id="41" name="TextBox 40">
+            <a:extLst>
+              <a:ext uri="{FF2B5EF4-FFF2-40B4-BE49-F238E27FC236}">
+                <a16:creationId xmlns:a16="http://schemas.microsoft.com/office/drawing/2014/main" id="{AE3902BB-09D8-9DDB-3DE0-6020A2A30984}"/>
+              </a:ext>
+            </a:extLst>
+          </p:cNvPr>
+          <p:cNvSpPr txBox="1"/>
+          <p:nvPr/>
+        </p:nvSpPr>
+        <p:spPr>
+          <a:xfrm>
+            <a:off x="7730185" y="1545174"/>
+            <a:ext cx="988029" cy="230832"/>
+          </a:xfrm>
+          <a:prstGeom prst="rect">
+            <a:avLst/>
+          </a:prstGeom>
+          <a:noFill/>
+        </p:spPr>
+        <p:txBody>
+          <a:bodyPr wrap="square" rtlCol="0">
+            <a:spAutoFit/>
+          </a:bodyPr>
+          <a:lstStyle/>
+          <a:p>
+            <a:r>
+              <a:rPr lang="en-SG" sz="900" dirty="0">
+                <a:solidFill>
+                  <a:srgbClr val="002060"/>
+                </a:solidFill>
+              </a:rPr>
+              <a:t>NCL Server</a:t>
+            </a:r>
+          </a:p>
+        </p:txBody>
+      </p:sp>
+      <p:sp>
+        <p:nvSpPr>
+          <p:cNvPr id="42" name="Rectangle 41">
+            <a:extLst>
+              <a:ext uri="{FF2B5EF4-FFF2-40B4-BE49-F238E27FC236}">
+                <a16:creationId xmlns:a16="http://schemas.microsoft.com/office/drawing/2014/main" id="{C7FDF853-402F-94DD-45D6-A5B442EACC61}"/>
+              </a:ext>
+            </a:extLst>
+          </p:cNvPr>
+          <p:cNvSpPr/>
+          <p:nvPr/>
+        </p:nvSpPr>
+        <p:spPr>
+          <a:xfrm>
+            <a:off x="4172938" y="2941530"/>
+            <a:ext cx="1249263" cy="815723"/>
+          </a:xfrm>
+          <a:prstGeom prst="rect">
+            <a:avLst/>
+          </a:prstGeom>
+          <a:ln>
+            <a:solidFill>
+              <a:srgbClr val="0070C0"/>
+            </a:solidFill>
+            <a:prstDash val="dash"/>
+          </a:ln>
+        </p:spPr>
+        <p:style>
+          <a:lnRef idx="2">
+            <a:schemeClr val="accent6"/>
+          </a:lnRef>
+          <a:fillRef idx="1">
+            <a:schemeClr val="lt1"/>
+          </a:fillRef>
+          <a:effectRef idx="0">
+            <a:schemeClr val="accent6"/>
+          </a:effectRef>
+          <a:fontRef idx="minor">
+            <a:schemeClr val="dk1"/>
+          </a:fontRef>
+        </p:style>
+        <p:txBody>
+          <a:bodyPr rtlCol="0" anchor="ctr"/>
+          <a:lstStyle/>
+          <a:p>
+            <a:pPr algn="ctr"/>
+            <a:endParaRPr lang="en-SG" dirty="0"/>
+          </a:p>
+        </p:txBody>
+      </p:sp>
+      <p:sp>
+        <p:nvSpPr>
+          <p:cNvPr id="43" name="TextBox 42">
+            <a:extLst>
+              <a:ext uri="{FF2B5EF4-FFF2-40B4-BE49-F238E27FC236}">
+                <a16:creationId xmlns:a16="http://schemas.microsoft.com/office/drawing/2014/main" id="{E7A0A5AE-3F5D-FB55-607E-B9B774AD7737}"/>
+              </a:ext>
+            </a:extLst>
+          </p:cNvPr>
+          <p:cNvSpPr txBox="1"/>
+          <p:nvPr/>
+        </p:nvSpPr>
+        <p:spPr>
+          <a:xfrm>
+            <a:off x="4086890" y="2724317"/>
+            <a:ext cx="988029" cy="230832"/>
+          </a:xfrm>
+          <a:prstGeom prst="rect">
+            <a:avLst/>
+          </a:prstGeom>
+          <a:noFill/>
+        </p:spPr>
+        <p:txBody>
+          <a:bodyPr wrap="square" rtlCol="0">
+            <a:spAutoFit/>
+          </a:bodyPr>
+          <a:lstStyle/>
+          <a:p>
+            <a:r>
+              <a:rPr lang="en-SG" sz="900" dirty="0">
+                <a:solidFill>
+                  <a:srgbClr val="002060"/>
+                </a:solidFill>
+              </a:rPr>
+              <a:t>Threads Pool</a:t>
+            </a:r>
+          </a:p>
+        </p:txBody>
+      </p:sp>
+      <p:sp>
+        <p:nvSpPr>
+          <p:cNvPr id="44" name="TextBox 43">
+            <a:extLst>
+              <a:ext uri="{FF2B5EF4-FFF2-40B4-BE49-F238E27FC236}">
+                <a16:creationId xmlns:a16="http://schemas.microsoft.com/office/drawing/2014/main" id="{16AA59D9-A38F-A842-F770-D396E2261912}"/>
+              </a:ext>
+            </a:extLst>
+          </p:cNvPr>
+          <p:cNvSpPr txBox="1"/>
+          <p:nvPr/>
+        </p:nvSpPr>
+        <p:spPr>
+          <a:xfrm>
+            <a:off x="4313611" y="3025114"/>
+            <a:ext cx="822672" cy="246221"/>
+          </a:xfrm>
+          <a:prstGeom prst="rect">
+            <a:avLst/>
+          </a:prstGeom>
+          <a:noFill/>
+          <a:ln w="12700">
+            <a:solidFill>
+              <a:schemeClr val="tx1"/>
+            </a:solidFill>
+            <a:prstDash val="solid"/>
+          </a:ln>
+        </p:spPr>
+        <p:txBody>
+          <a:bodyPr wrap="square" rtlCol="0">
+            <a:spAutoFit/>
+          </a:bodyPr>
+          <a:lstStyle/>
+          <a:p>
+            <a:r>
+              <a:rPr lang="en-SG" sz="1000" b="1" dirty="0"/>
+              <a:t>User tester</a:t>
+            </a:r>
+          </a:p>
+        </p:txBody>
+      </p:sp>
+      <p:sp>
+        <p:nvSpPr>
+          <p:cNvPr id="45" name="TextBox 44">
+            <a:extLst>
+              <a:ext uri="{FF2B5EF4-FFF2-40B4-BE49-F238E27FC236}">
+                <a16:creationId xmlns:a16="http://schemas.microsoft.com/office/drawing/2014/main" id="{9A6FBC5A-8427-91C1-732D-946B5304CC77}"/>
+              </a:ext>
+            </a:extLst>
+          </p:cNvPr>
+          <p:cNvSpPr txBox="1"/>
+          <p:nvPr/>
+        </p:nvSpPr>
+        <p:spPr>
+          <a:xfrm>
+            <a:off x="4591731" y="3156634"/>
+            <a:ext cx="362198" cy="369332"/>
+          </a:xfrm>
+          <a:prstGeom prst="rect">
+            <a:avLst/>
+          </a:prstGeom>
+          <a:noFill/>
+        </p:spPr>
+        <p:txBody>
+          <a:bodyPr wrap="square" rtlCol="0">
+            <a:spAutoFit/>
+          </a:bodyPr>
+          <a:lstStyle/>
+          <a:p>
+            <a:r>
+              <a:rPr lang="en-US" dirty="0"/>
+              <a:t>…</a:t>
+            </a:r>
+          </a:p>
+        </p:txBody>
+      </p:sp>
+      <p:sp>
+        <p:nvSpPr>
+          <p:cNvPr id="46" name="TextBox 45">
+            <a:extLst>
+              <a:ext uri="{FF2B5EF4-FFF2-40B4-BE49-F238E27FC236}">
+                <a16:creationId xmlns:a16="http://schemas.microsoft.com/office/drawing/2014/main" id="{6081730F-69F8-8B16-617D-84E2EA9CD983}"/>
+              </a:ext>
+            </a:extLst>
+          </p:cNvPr>
+          <p:cNvSpPr txBox="1"/>
+          <p:nvPr/>
+        </p:nvSpPr>
+        <p:spPr>
+          <a:xfrm>
+            <a:off x="4329254" y="3456001"/>
+            <a:ext cx="822672" cy="246221"/>
+          </a:xfrm>
+          <a:prstGeom prst="rect">
+            <a:avLst/>
+          </a:prstGeom>
+          <a:noFill/>
+          <a:ln w="12700">
+            <a:solidFill>
+              <a:schemeClr val="tx1"/>
+            </a:solidFill>
+            <a:prstDash val="solid"/>
+          </a:ln>
+        </p:spPr>
+        <p:txBody>
+          <a:bodyPr wrap="square" rtlCol="0">
+            <a:spAutoFit/>
+          </a:bodyPr>
+          <a:lstStyle/>
+          <a:p>
+            <a:r>
+              <a:rPr lang="en-SG" sz="1000" b="1" dirty="0"/>
+              <a:t>User tester</a:t>
+            </a:r>
+          </a:p>
+        </p:txBody>
+      </p:sp>
+      <p:cxnSp>
+        <p:nvCxnSpPr>
+          <p:cNvPr id="47" name="Straight Arrow Connector 46">
+            <a:extLst>
+              <a:ext uri="{FF2B5EF4-FFF2-40B4-BE49-F238E27FC236}">
+                <a16:creationId xmlns:a16="http://schemas.microsoft.com/office/drawing/2014/main" id="{8F69831B-E346-0B0A-F61E-CB21045037BD}"/>
+              </a:ext>
+            </a:extLst>
+          </p:cNvPr>
+          <p:cNvCxnSpPr>
+            <a:cxnSpLocks/>
+            <a:endCxn id="42" idx="1"/>
+          </p:cNvCxnSpPr>
+          <p:nvPr/>
+        </p:nvCxnSpPr>
+        <p:spPr>
+          <a:xfrm>
+            <a:off x="3739608" y="2372242"/>
+            <a:ext cx="433330" cy="977150"/>
+          </a:xfrm>
+          <a:prstGeom prst="straightConnector1">
+            <a:avLst/>
+          </a:prstGeom>
+          <a:ln w="19050">
+            <a:tailEnd type="triangle"/>
+          </a:ln>
+        </p:spPr>
+        <p:style>
+          <a:lnRef idx="1">
+            <a:schemeClr val="accent1"/>
+          </a:lnRef>
+          <a:fillRef idx="0">
+            <a:schemeClr val="accent1"/>
+          </a:fillRef>
+          <a:effectRef idx="0">
+            <a:schemeClr val="accent1"/>
+          </a:effectRef>
+          <a:fontRef idx="minor">
+            <a:schemeClr val="tx1"/>
+          </a:fontRef>
+        </p:style>
+      </p:cxnSp>
+      <p:cxnSp>
+        <p:nvCxnSpPr>
+          <p:cNvPr id="49" name="Straight Arrow Connector 48">
+            <a:extLst>
+              <a:ext uri="{FF2B5EF4-FFF2-40B4-BE49-F238E27FC236}">
+                <a16:creationId xmlns:a16="http://schemas.microsoft.com/office/drawing/2014/main" id="{0D27D679-D49A-8772-58F2-2E9870E13F48}"/>
+              </a:ext>
+            </a:extLst>
+          </p:cNvPr>
+          <p:cNvCxnSpPr>
+            <a:cxnSpLocks/>
+          </p:cNvCxnSpPr>
+          <p:nvPr/>
+        </p:nvCxnSpPr>
+        <p:spPr>
+          <a:xfrm flipV="1">
+            <a:off x="5136283" y="2271331"/>
+            <a:ext cx="704711" cy="885303"/>
+          </a:xfrm>
+          <a:prstGeom prst="straightConnector1">
+            <a:avLst/>
+          </a:prstGeom>
+          <a:ln w="19050">
+            <a:tailEnd type="triangle"/>
+          </a:ln>
+        </p:spPr>
+        <p:style>
+          <a:lnRef idx="1">
+            <a:schemeClr val="accent1"/>
+          </a:lnRef>
+          <a:fillRef idx="0">
+            <a:schemeClr val="accent1"/>
+          </a:fillRef>
+          <a:effectRef idx="0">
+            <a:schemeClr val="accent1"/>
+          </a:effectRef>
+          <a:fontRef idx="minor">
+            <a:schemeClr val="tx1"/>
+          </a:fontRef>
+        </p:style>
+      </p:cxnSp>
+      <p:cxnSp>
+        <p:nvCxnSpPr>
+          <p:cNvPr id="51" name="Straight Arrow Connector 50">
+            <a:extLst>
+              <a:ext uri="{FF2B5EF4-FFF2-40B4-BE49-F238E27FC236}">
+                <a16:creationId xmlns:a16="http://schemas.microsoft.com/office/drawing/2014/main" id="{63549EE8-B7B8-2201-B54C-B3EC8C6E3C8E}"/>
+              </a:ext>
+            </a:extLst>
+          </p:cNvPr>
+          <p:cNvCxnSpPr>
+            <a:cxnSpLocks/>
+          </p:cNvCxnSpPr>
+          <p:nvPr/>
+        </p:nvCxnSpPr>
+        <p:spPr>
+          <a:xfrm flipV="1">
+            <a:off x="5177237" y="2277690"/>
+            <a:ext cx="781718" cy="1266178"/>
+          </a:xfrm>
+          <a:prstGeom prst="straightConnector1">
+            <a:avLst/>
+          </a:prstGeom>
+          <a:ln w="19050">
+            <a:tailEnd type="triangle"/>
+          </a:ln>
+        </p:spPr>
+        <p:style>
+          <a:lnRef idx="1">
+            <a:schemeClr val="accent1"/>
+          </a:lnRef>
+          <a:fillRef idx="0">
+            <a:schemeClr val="accent1"/>
+          </a:fillRef>
+          <a:effectRef idx="0">
+            <a:schemeClr val="accent1"/>
+          </a:effectRef>
+          <a:fontRef idx="minor">
+            <a:schemeClr val="tx1"/>
+          </a:fontRef>
+        </p:style>
+      </p:cxnSp>
+      <p:sp>
+        <p:nvSpPr>
+          <p:cNvPr id="56" name="Rectangle 55">
+            <a:extLst>
+              <a:ext uri="{FF2B5EF4-FFF2-40B4-BE49-F238E27FC236}">
+                <a16:creationId xmlns:a16="http://schemas.microsoft.com/office/drawing/2014/main" id="{E44807C8-00C3-DC41-150F-87C191435B5C}"/>
+              </a:ext>
+            </a:extLst>
+          </p:cNvPr>
+          <p:cNvSpPr/>
+          <p:nvPr/>
+        </p:nvSpPr>
+        <p:spPr>
+          <a:xfrm>
+            <a:off x="7836487" y="3005640"/>
+            <a:ext cx="881727" cy="815723"/>
+          </a:xfrm>
+          <a:prstGeom prst="rect">
+            <a:avLst/>
+          </a:prstGeom>
+          <a:ln>
+            <a:solidFill>
+              <a:srgbClr val="0070C0"/>
+            </a:solidFill>
+            <a:prstDash val="dash"/>
+          </a:ln>
+        </p:spPr>
+        <p:style>
+          <a:lnRef idx="2">
+            <a:schemeClr val="accent6"/>
+          </a:lnRef>
+          <a:fillRef idx="1">
+            <a:schemeClr val="lt1"/>
+          </a:fillRef>
+          <a:effectRef idx="0">
+            <a:schemeClr val="accent6"/>
+          </a:effectRef>
+          <a:fontRef idx="minor">
+            <a:schemeClr val="dk1"/>
+          </a:fontRef>
+        </p:style>
+        <p:txBody>
+          <a:bodyPr rtlCol="0" anchor="ctr"/>
+          <a:lstStyle/>
+          <a:p>
+            <a:pPr algn="ctr"/>
+            <a:endParaRPr lang="en-SG" dirty="0"/>
+          </a:p>
+        </p:txBody>
+      </p:sp>
+      <p:pic>
+        <p:nvPicPr>
+          <p:cNvPr id="57" name="Picture 56">
+            <a:extLst>
+              <a:ext uri="{FF2B5EF4-FFF2-40B4-BE49-F238E27FC236}">
+                <a16:creationId xmlns:a16="http://schemas.microsoft.com/office/drawing/2014/main" id="{E1682010-07F7-7DCA-6B06-6A2A72F1B2C9}"/>
+              </a:ext>
+            </a:extLst>
+          </p:cNvPr>
+          <p:cNvPicPr>
+            <a:picLocks noChangeAspect="1"/>
+          </p:cNvPicPr>
+          <p:nvPr/>
+        </p:nvPicPr>
+        <p:blipFill>
+          <a:blip r:embed="rId4"/>
+          <a:stretch>
+            <a:fillRect/>
+          </a:stretch>
+        </p:blipFill>
+        <p:spPr>
+          <a:xfrm>
+            <a:off x="8153277" y="3105779"/>
+            <a:ext cx="324269" cy="222575"/>
+          </a:xfrm>
+          <a:prstGeom prst="rect">
+            <a:avLst/>
+          </a:prstGeom>
+        </p:spPr>
+      </p:pic>
+      <p:pic>
+        <p:nvPicPr>
+          <p:cNvPr id="58" name="Picture 57">
+            <a:extLst>
+              <a:ext uri="{FF2B5EF4-FFF2-40B4-BE49-F238E27FC236}">
+                <a16:creationId xmlns:a16="http://schemas.microsoft.com/office/drawing/2014/main" id="{FB4CFDB6-54B6-6603-41B2-2154CF1CBF18}"/>
+              </a:ext>
+            </a:extLst>
+          </p:cNvPr>
+          <p:cNvPicPr>
+            <a:picLocks noChangeAspect="1"/>
+          </p:cNvPicPr>
+          <p:nvPr/>
+        </p:nvPicPr>
+        <p:blipFill>
+          <a:blip r:embed="rId4"/>
+          <a:stretch>
+            <a:fillRect/>
+          </a:stretch>
+        </p:blipFill>
+        <p:spPr>
+          <a:xfrm>
+            <a:off x="8184150" y="3481239"/>
+            <a:ext cx="324269" cy="222575"/>
+          </a:xfrm>
+          <a:prstGeom prst="rect">
+            <a:avLst/>
+          </a:prstGeom>
+        </p:spPr>
+      </p:pic>
+      <p:cxnSp>
+        <p:nvCxnSpPr>
+          <p:cNvPr id="59" name="Straight Arrow Connector 58">
+            <a:extLst>
+              <a:ext uri="{FF2B5EF4-FFF2-40B4-BE49-F238E27FC236}">
+                <a16:creationId xmlns:a16="http://schemas.microsoft.com/office/drawing/2014/main" id="{22FEEA1B-63E4-EAD3-F06F-5DD0E94A43EC}"/>
+              </a:ext>
+            </a:extLst>
+          </p:cNvPr>
+          <p:cNvCxnSpPr>
+            <a:cxnSpLocks/>
+          </p:cNvCxnSpPr>
+          <p:nvPr/>
+        </p:nvCxnSpPr>
+        <p:spPr>
+          <a:xfrm>
+            <a:off x="7155749" y="2190486"/>
+            <a:ext cx="950372" cy="966148"/>
+          </a:xfrm>
+          <a:prstGeom prst="straightConnector1">
+            <a:avLst/>
+          </a:prstGeom>
+          <a:ln w="19050">
+            <a:tailEnd type="triangle"/>
+          </a:ln>
+        </p:spPr>
+        <p:style>
+          <a:lnRef idx="1">
+            <a:schemeClr val="accent1"/>
+          </a:lnRef>
+          <a:fillRef idx="0">
+            <a:schemeClr val="accent1"/>
+          </a:fillRef>
+          <a:effectRef idx="0">
+            <a:schemeClr val="accent1"/>
+          </a:effectRef>
+          <a:fontRef idx="minor">
+            <a:schemeClr val="tx1"/>
+          </a:fontRef>
+        </p:style>
+      </p:cxnSp>
+      <p:cxnSp>
+        <p:nvCxnSpPr>
+          <p:cNvPr id="61" name="Straight Arrow Connector 60">
+            <a:extLst>
+              <a:ext uri="{FF2B5EF4-FFF2-40B4-BE49-F238E27FC236}">
+                <a16:creationId xmlns:a16="http://schemas.microsoft.com/office/drawing/2014/main" id="{3AF1B488-B1B9-6EDA-40CE-3064CCE3F063}"/>
+              </a:ext>
+            </a:extLst>
+          </p:cNvPr>
+          <p:cNvCxnSpPr>
+            <a:cxnSpLocks/>
+          </p:cNvCxnSpPr>
+          <p:nvPr/>
+        </p:nvCxnSpPr>
+        <p:spPr>
+          <a:xfrm>
+            <a:off x="7071715" y="2277690"/>
+            <a:ext cx="1034406" cy="1266178"/>
+          </a:xfrm>
+          <a:prstGeom prst="straightConnector1">
+            <a:avLst/>
+          </a:prstGeom>
+          <a:ln w="19050">
+            <a:tailEnd type="triangle"/>
+          </a:ln>
+        </p:spPr>
+        <p:style>
+          <a:lnRef idx="1">
+            <a:schemeClr val="accent1"/>
+          </a:lnRef>
+          <a:fillRef idx="0">
+            <a:schemeClr val="accent1"/>
+          </a:fillRef>
+          <a:effectRef idx="0">
+            <a:schemeClr val="accent1"/>
+          </a:effectRef>
+          <a:fontRef idx="minor">
+            <a:schemeClr val="tx1"/>
+          </a:fontRef>
+        </p:style>
+      </p:cxnSp>
+      <p:sp>
+        <p:nvSpPr>
+          <p:cNvPr id="64" name="TextBox 63">
+            <a:extLst>
+              <a:ext uri="{FF2B5EF4-FFF2-40B4-BE49-F238E27FC236}">
+                <a16:creationId xmlns:a16="http://schemas.microsoft.com/office/drawing/2014/main" id="{9AC87B1E-52AB-1BE5-34FB-C03A2FC80B9D}"/>
+              </a:ext>
+            </a:extLst>
+          </p:cNvPr>
+          <p:cNvSpPr txBox="1"/>
+          <p:nvPr/>
+        </p:nvSpPr>
+        <p:spPr>
+          <a:xfrm>
+            <a:off x="4716420" y="2505029"/>
+            <a:ext cx="362198" cy="369332"/>
+          </a:xfrm>
+          <a:prstGeom prst="rect">
+            <a:avLst/>
+          </a:prstGeom>
+          <a:noFill/>
+        </p:spPr>
+        <p:txBody>
+          <a:bodyPr wrap="square" rtlCol="0">
+            <a:spAutoFit/>
+          </a:bodyPr>
+          <a:lstStyle/>
+          <a:p>
+            <a:r>
+              <a:rPr lang="en-US" dirty="0"/>
+              <a:t>…</a:t>
+            </a:r>
+          </a:p>
+        </p:txBody>
+      </p:sp>
+      <p:sp>
+        <p:nvSpPr>
+          <p:cNvPr id="65" name="TextBox 64">
+            <a:extLst>
+              <a:ext uri="{FF2B5EF4-FFF2-40B4-BE49-F238E27FC236}">
+                <a16:creationId xmlns:a16="http://schemas.microsoft.com/office/drawing/2014/main" id="{E279B545-F03C-8A1A-175C-86F8D584DAC1}"/>
+              </a:ext>
+            </a:extLst>
+          </p:cNvPr>
+          <p:cNvSpPr txBox="1"/>
+          <p:nvPr/>
+        </p:nvSpPr>
+        <p:spPr>
+          <a:xfrm>
+            <a:off x="6331053" y="1812773"/>
+            <a:ext cx="284476" cy="369332"/>
+          </a:xfrm>
+          <a:prstGeom prst="rect">
+            <a:avLst/>
+          </a:prstGeom>
+          <a:noFill/>
+        </p:spPr>
+        <p:txBody>
+          <a:bodyPr wrap="square" rtlCol="0">
+            <a:spAutoFit/>
+          </a:bodyPr>
+          <a:lstStyle/>
+          <a:p>
+            <a:r>
+              <a:rPr lang="en-US" dirty="0"/>
+              <a:t>…</a:t>
+            </a:r>
+          </a:p>
+        </p:txBody>
+      </p:sp>
+      <p:sp>
+        <p:nvSpPr>
+          <p:cNvPr id="66" name="TextBox 65">
+            <a:extLst>
+              <a:ext uri="{FF2B5EF4-FFF2-40B4-BE49-F238E27FC236}">
+                <a16:creationId xmlns:a16="http://schemas.microsoft.com/office/drawing/2014/main" id="{1D2A5AD2-BCF4-AAA4-951A-ECA30A58403D}"/>
+              </a:ext>
+            </a:extLst>
+          </p:cNvPr>
+          <p:cNvSpPr txBox="1"/>
+          <p:nvPr/>
+        </p:nvSpPr>
+        <p:spPr>
+          <a:xfrm>
+            <a:off x="8184150" y="3192095"/>
+            <a:ext cx="362198" cy="369332"/>
+          </a:xfrm>
+          <a:prstGeom prst="rect">
+            <a:avLst/>
+          </a:prstGeom>
+          <a:noFill/>
+        </p:spPr>
+        <p:txBody>
+          <a:bodyPr wrap="square" rtlCol="0">
+            <a:spAutoFit/>
+          </a:bodyPr>
+          <a:lstStyle/>
+          <a:p>
+            <a:r>
+              <a:rPr lang="en-US" dirty="0"/>
+              <a:t>…</a:t>
+            </a:r>
+          </a:p>
+        </p:txBody>
+      </p:sp>
+      <p:sp>
+        <p:nvSpPr>
+          <p:cNvPr id="67" name="TextBox 66">
+            <a:extLst>
+              <a:ext uri="{FF2B5EF4-FFF2-40B4-BE49-F238E27FC236}">
+                <a16:creationId xmlns:a16="http://schemas.microsoft.com/office/drawing/2014/main" id="{8D6D3E28-8CC1-D34A-9DA5-873CD9F4A5E5}"/>
+              </a:ext>
+            </a:extLst>
+          </p:cNvPr>
+          <p:cNvSpPr txBox="1"/>
+          <p:nvPr/>
+        </p:nvSpPr>
+        <p:spPr>
+          <a:xfrm>
+            <a:off x="8162504" y="1987867"/>
+            <a:ext cx="362198" cy="369332"/>
+          </a:xfrm>
+          <a:prstGeom prst="rect">
+            <a:avLst/>
+          </a:prstGeom>
+          <a:noFill/>
+        </p:spPr>
+        <p:txBody>
+          <a:bodyPr wrap="square" rtlCol="0">
+            <a:spAutoFit/>
+          </a:bodyPr>
+          <a:lstStyle/>
+          <a:p>
+            <a:r>
+              <a:rPr lang="en-US" dirty="0"/>
+              <a:t>…</a:t>
+            </a:r>
+          </a:p>
+        </p:txBody>
+      </p:sp>
+    </p:spTree>
+    <p:extLst>
+      <p:ext uri="{BB962C8B-B14F-4D97-AF65-F5344CB8AC3E}">
+        <p14:creationId xmlns:p14="http://schemas.microsoft.com/office/powerpoint/2010/main" val="4117318760"/>
+      </p:ext>
+    </p:extLst>
+  </p:cSld>
+  <p:clrMapOvr>
+    <a:masterClrMapping/>
+  </p:clrMapOvr>
+</p:sld>
+</file>
+
 <file path=ppt/theme/theme1.xml><?xml version="1.0" encoding="utf-8"?>
 <a:theme xmlns:a="http://schemas.openxmlformats.org/drawingml/2006/main" name="Office Theme">
   <a:themeElements>

</xml_diff>